<commit_message>
Update DG QuizModel Class diag and quiz feature
</commit_message>
<xml_diff>
--- a/docs/diagrams/QuizModelComponentClassDiagram.pptx
+++ b/docs/diagrams/QuizModelComponentClassDiagram.pptx
@@ -208,7 +208,7 @@
           <a:p>
             <a:fld id="{F5CC4B3F-88C1-4FFA-B1B6-F41C21DC6924}" type="datetimeFigureOut">
               <a:rPr lang="en-US" smtClean="0"/>
-              <a:t>3/9/2019</a:t>
+              <a:t>4/2/2019</a:t>
             </a:fld>
             <a:endParaRPr lang="en-US"/>
           </a:p>
@@ -654,7 +654,7 @@
           <a:p>
             <a:fld id="{78C97017-6FC3-485B-9764-EAC9E56C1D49}" type="datetimeFigureOut">
               <a:rPr lang="en-US" smtClean="0"/>
-              <a:t>3/9/2019</a:t>
+              <a:t>4/2/2019</a:t>
             </a:fld>
             <a:endParaRPr lang="en-US"/>
           </a:p>
@@ -822,7 +822,7 @@
           <a:p>
             <a:fld id="{78C97017-6FC3-485B-9764-EAC9E56C1D49}" type="datetimeFigureOut">
               <a:rPr lang="en-US" smtClean="0"/>
-              <a:t>3/9/2019</a:t>
+              <a:t>4/2/2019</a:t>
             </a:fld>
             <a:endParaRPr lang="en-US"/>
           </a:p>
@@ -1000,7 +1000,7 @@
           <a:p>
             <a:fld id="{78C97017-6FC3-485B-9764-EAC9E56C1D49}" type="datetimeFigureOut">
               <a:rPr lang="en-US" smtClean="0"/>
-              <a:t>3/9/2019</a:t>
+              <a:t>4/2/2019</a:t>
             </a:fld>
             <a:endParaRPr lang="en-US"/>
           </a:p>
@@ -1168,7 +1168,7 @@
           <a:p>
             <a:fld id="{78C97017-6FC3-485B-9764-EAC9E56C1D49}" type="datetimeFigureOut">
               <a:rPr lang="en-US" smtClean="0"/>
-              <a:t>3/9/2019</a:t>
+              <a:t>4/2/2019</a:t>
             </a:fld>
             <a:endParaRPr lang="en-US"/>
           </a:p>
@@ -1413,7 +1413,7 @@
           <a:p>
             <a:fld id="{78C97017-6FC3-485B-9764-EAC9E56C1D49}" type="datetimeFigureOut">
               <a:rPr lang="en-US" smtClean="0"/>
-              <a:t>3/9/2019</a:t>
+              <a:t>4/2/2019</a:t>
             </a:fld>
             <a:endParaRPr lang="en-US"/>
           </a:p>
@@ -1698,7 +1698,7 @@
           <a:p>
             <a:fld id="{78C97017-6FC3-485B-9764-EAC9E56C1D49}" type="datetimeFigureOut">
               <a:rPr lang="en-US" smtClean="0"/>
-              <a:t>3/9/2019</a:t>
+              <a:t>4/2/2019</a:t>
             </a:fld>
             <a:endParaRPr lang="en-US"/>
           </a:p>
@@ -2117,7 +2117,7 @@
           <a:p>
             <a:fld id="{78C97017-6FC3-485B-9764-EAC9E56C1D49}" type="datetimeFigureOut">
               <a:rPr lang="en-US" smtClean="0"/>
-              <a:t>3/9/2019</a:t>
+              <a:t>4/2/2019</a:t>
             </a:fld>
             <a:endParaRPr lang="en-US"/>
           </a:p>
@@ -2234,7 +2234,7 @@
           <a:p>
             <a:fld id="{78C97017-6FC3-485B-9764-EAC9E56C1D49}" type="datetimeFigureOut">
               <a:rPr lang="en-US" smtClean="0"/>
-              <a:t>3/9/2019</a:t>
+              <a:t>4/2/2019</a:t>
             </a:fld>
             <a:endParaRPr lang="en-US"/>
           </a:p>
@@ -2329,7 +2329,7 @@
           <a:p>
             <a:fld id="{78C97017-6FC3-485B-9764-EAC9E56C1D49}" type="datetimeFigureOut">
               <a:rPr lang="en-US" smtClean="0"/>
-              <a:t>3/9/2019</a:t>
+              <a:t>4/2/2019</a:t>
             </a:fld>
             <a:endParaRPr lang="en-US"/>
           </a:p>
@@ -2604,7 +2604,7 @@
           <a:p>
             <a:fld id="{78C97017-6FC3-485B-9764-EAC9E56C1D49}" type="datetimeFigureOut">
               <a:rPr lang="en-US" smtClean="0"/>
-              <a:t>3/9/2019</a:t>
+              <a:t>4/2/2019</a:t>
             </a:fld>
             <a:endParaRPr lang="en-US"/>
           </a:p>
@@ -2856,7 +2856,7 @@
           <a:p>
             <a:fld id="{78C97017-6FC3-485B-9764-EAC9E56C1D49}" type="datetimeFigureOut">
               <a:rPr lang="en-US" smtClean="0"/>
-              <a:t>3/9/2019</a:t>
+              <a:t>4/2/2019</a:t>
             </a:fld>
             <a:endParaRPr lang="en-US"/>
           </a:p>
@@ -3067,7 +3067,7 @@
           <a:p>
             <a:fld id="{78C97017-6FC3-485B-9764-EAC9E56C1D49}" type="datetimeFigureOut">
               <a:rPr lang="en-US" smtClean="0"/>
-              <a:t>3/9/2019</a:t>
+              <a:t>4/2/2019</a:t>
             </a:fld>
             <a:endParaRPr lang="en-US"/>
           </a:p>
@@ -3450,8 +3450,8 @@
         </p:nvSpPr>
         <p:spPr>
           <a:xfrm>
-            <a:off x="2057401" y="1295400"/>
-            <a:ext cx="4191000" cy="2578405"/>
+            <a:off x="1278338" y="1162269"/>
+            <a:ext cx="6023159" cy="3025871"/>
           </a:xfrm>
           <a:prstGeom prst="roundRect">
             <a:avLst>
@@ -3508,8 +3508,8 @@
         </p:nvSpPr>
         <p:spPr>
           <a:xfrm rot="16200000">
-            <a:off x="2496873" y="2919919"/>
-            <a:ext cx="1330184" cy="346760"/>
+            <a:off x="2514265" y="3065119"/>
+            <a:ext cx="1295400" cy="346760"/>
           </a:xfrm>
           <a:prstGeom prst="rect">
             <a:avLst/>
@@ -3588,7 +3588,7 @@
         </p:nvSpPr>
         <p:spPr>
           <a:xfrm rot="16200000">
-            <a:off x="1870602" y="2919919"/>
+            <a:off x="1870603" y="3056328"/>
             <a:ext cx="1093635" cy="346760"/>
           </a:xfrm>
           <a:prstGeom prst="rect">
@@ -3679,7 +3679,7 @@
         </p:nvSpPr>
         <p:spPr>
           <a:xfrm rot="16200000">
-            <a:off x="2558095" y="3011008"/>
+            <a:off x="2558096" y="3147417"/>
             <a:ext cx="270504" cy="175523"/>
           </a:xfrm>
           <a:prstGeom prst="triangle">
@@ -3730,7 +3730,7 @@
         </p:nvCxnSpPr>
         <p:spPr>
           <a:xfrm>
-            <a:off x="1820227" y="3095734"/>
+            <a:off x="1052294" y="3229707"/>
             <a:ext cx="419548" cy="2860"/>
           </a:xfrm>
           <a:prstGeom prst="bentConnector3">
@@ -3776,9 +3776,9 @@
           <p:nvPr/>
         </p:nvCxnSpPr>
         <p:spPr>
-          <a:xfrm flipV="1">
-            <a:off x="2781109" y="3093299"/>
-            <a:ext cx="207476" cy="5471"/>
+          <a:xfrm>
+            <a:off x="2781110" y="3235179"/>
+            <a:ext cx="207475" cy="3320"/>
           </a:xfrm>
           <a:prstGeom prst="line">
             <a:avLst/>
@@ -3825,9 +3825,9 @@
           <p:nvPr/>
         </p:nvCxnSpPr>
         <p:spPr>
-          <a:xfrm>
-            <a:off x="3561321" y="2820747"/>
-            <a:ext cx="233298" cy="0"/>
+          <a:xfrm flipV="1">
+            <a:off x="3561321" y="2764930"/>
+            <a:ext cx="233298" cy="1428"/>
           </a:xfrm>
           <a:prstGeom prst="straightConnector1">
             <a:avLst/>
@@ -3870,7 +3870,7 @@
         </p:nvSpPr>
         <p:spPr>
           <a:xfrm>
-            <a:off x="3345321" y="2712747"/>
+            <a:off x="3345321" y="2658358"/>
             <a:ext cx="216000" cy="216000"/>
           </a:xfrm>
           <a:prstGeom prst="flowChartDecision">
@@ -3925,7 +3925,7 @@
         </p:nvSpPr>
         <p:spPr>
           <a:xfrm>
-            <a:off x="3616204" y="2869443"/>
+            <a:off x="3616204" y="2815054"/>
             <a:ext cx="189257" cy="178683"/>
           </a:xfrm>
           <a:prstGeom prst="rect">
@@ -3970,8 +3970,8 @@
         </p:nvSpPr>
         <p:spPr>
           <a:xfrm>
-            <a:off x="3794619" y="2647367"/>
-            <a:ext cx="698198" cy="346760"/>
+            <a:off x="3794619" y="2623526"/>
+            <a:ext cx="790812" cy="282808"/>
           </a:xfrm>
           <a:prstGeom prst="rect">
             <a:avLst/>
@@ -4056,8 +4056,8 @@
         </p:nvSpPr>
         <p:spPr>
           <a:xfrm>
-            <a:off x="4927681" y="2647367"/>
-            <a:ext cx="698199" cy="346760"/>
+            <a:off x="5065446" y="2621020"/>
+            <a:ext cx="698199" cy="282808"/>
           </a:xfrm>
           <a:prstGeom prst="rect">
             <a:avLst/>
@@ -4142,7 +4142,7 @@
         </p:nvSpPr>
         <p:spPr>
           <a:xfrm>
-            <a:off x="4510342" y="2711319"/>
+            <a:off x="4591471" y="2656930"/>
             <a:ext cx="216000" cy="216000"/>
           </a:xfrm>
           <a:prstGeom prst="flowChartDecision">
@@ -4202,9 +4202,9 @@
           <p:nvPr/>
         </p:nvCxnSpPr>
         <p:spPr>
-          <a:xfrm>
-            <a:off x="4726342" y="2819319"/>
-            <a:ext cx="201339" cy="1428"/>
+          <a:xfrm flipV="1">
+            <a:off x="4807471" y="2762424"/>
+            <a:ext cx="257975" cy="2506"/>
           </a:xfrm>
           <a:prstGeom prst="straightConnector1">
             <a:avLst/>
@@ -4247,7 +4247,7 @@
         </p:nvSpPr>
         <p:spPr>
           <a:xfrm>
-            <a:off x="4732382" y="2868730"/>
+            <a:off x="4876800" y="2809987"/>
             <a:ext cx="189257" cy="178683"/>
           </a:xfrm>
           <a:prstGeom prst="rect">
@@ -4295,10 +4295,10 @@
         </p:nvGrpSpPr>
         <p:grpSpPr>
           <a:xfrm>
-            <a:off x="4921639" y="1494516"/>
-            <a:ext cx="1190625" cy="979471"/>
+            <a:off x="5972511" y="1640773"/>
+            <a:ext cx="1190625" cy="1098137"/>
             <a:chOff x="5257800" y="990600"/>
-            <a:chExt cx="1190625" cy="979471"/>
+            <a:chExt cx="1190625" cy="1098137"/>
           </a:xfrm>
         </p:grpSpPr>
         <p:sp>
@@ -4413,7 +4413,7 @@
           <p:spPr>
             <a:xfrm>
               <a:off x="5257800" y="1371600"/>
-              <a:ext cx="1190625" cy="598471"/>
+              <a:ext cx="1190625" cy="717137"/>
             </a:xfrm>
             <a:prstGeom prst="rect">
               <a:avLst/>
@@ -4496,10 +4496,1166 @@
                 </a:rPr>
                 <a:t>PREVIEW</a:t>
               </a:r>
+              <a:br>
+                <a:rPr lang="en-SG" sz="1050" dirty="0">
+                  <a:solidFill>
+                    <a:srgbClr val="597B78"/>
+                  </a:solidFill>
+                </a:rPr>
+              </a:br>
+              <a:r>
+                <a:rPr lang="en-SG" sz="1050" dirty="0">
+                  <a:solidFill>
+                    <a:srgbClr val="597B78"/>
+                  </a:solidFill>
+                </a:rPr>
+                <a:t>DIFFICULT</a:t>
+              </a:r>
             </a:p>
           </p:txBody>
         </p:sp>
       </p:grpSp>
+      <p:sp>
+        <p:nvSpPr>
+          <p:cNvPr id="20" name="Rectangle 62">
+            <a:extLst>
+              <a:ext uri="{FF2B5EF4-FFF2-40B4-BE49-F238E27FC236}">
+                <a16:creationId xmlns:a16="http://schemas.microsoft.com/office/drawing/2014/main" id="{5EF0C71E-E46B-4CEA-8D36-496304EC6633}"/>
+              </a:ext>
+            </a:extLst>
+          </p:cNvPr>
+          <p:cNvSpPr/>
+          <p:nvPr/>
+        </p:nvSpPr>
+        <p:spPr>
+          <a:xfrm rot="16200000">
+            <a:off x="1107519" y="3056326"/>
+            <a:ext cx="1093635" cy="346760"/>
+          </a:xfrm>
+          <a:prstGeom prst="rect">
+            <a:avLst/>
+          </a:prstGeom>
+          <a:gradFill flip="none" rotWithShape="1">
+            <a:gsLst>
+              <a:gs pos="0">
+                <a:srgbClr val="BED0CF">
+                  <a:tint val="66000"/>
+                  <a:satMod val="160000"/>
+                </a:srgbClr>
+              </a:gs>
+              <a:gs pos="50000">
+                <a:srgbClr val="BED0CF">
+                  <a:tint val="44500"/>
+                  <a:satMod val="160000"/>
+                </a:srgbClr>
+              </a:gs>
+              <a:gs pos="100000">
+                <a:srgbClr val="BED0CF">
+                  <a:tint val="23500"/>
+                  <a:satMod val="160000"/>
+                </a:srgbClr>
+              </a:gs>
+            </a:gsLst>
+            <a:lin ang="16200000" scaled="1"/>
+            <a:tileRect/>
+          </a:gradFill>
+          <a:ln w="19050">
+            <a:solidFill>
+              <a:srgbClr val="597B78"/>
+            </a:solidFill>
+          </a:ln>
+          <a:effectLst/>
+        </p:spPr>
+        <p:style>
+          <a:lnRef idx="1">
+            <a:schemeClr val="accent2"/>
+          </a:lnRef>
+          <a:fillRef idx="2">
+            <a:schemeClr val="accent2"/>
+          </a:fillRef>
+          <a:effectRef idx="1">
+            <a:schemeClr val="accent2"/>
+          </a:effectRef>
+          <a:fontRef idx="minor">
+            <a:schemeClr val="dk1"/>
+          </a:fontRef>
+        </p:style>
+        <p:txBody>
+          <a:bodyPr rtlCol="0" anchor="ctr"/>
+          <a:lstStyle/>
+          <a:p>
+            <a:pPr algn="ctr"/>
+            <a:r>
+              <a:rPr lang="en-US" sz="1050" dirty="0">
+                <a:solidFill>
+                  <a:srgbClr val="597B78"/>
+                </a:solidFill>
+              </a:rPr>
+              <a:t>&lt;&lt;interface&gt;&gt;</a:t>
+            </a:r>
+          </a:p>
+          <a:p>
+            <a:pPr algn="ctr"/>
+            <a:r>
+              <a:rPr lang="en-US" sz="1050" dirty="0">
+                <a:solidFill>
+                  <a:srgbClr val="597B78"/>
+                </a:solidFill>
+              </a:rPr>
+              <a:t>Model</a:t>
+            </a:r>
+            <a:endParaRPr lang="en-SG" sz="1050" dirty="0">
+              <a:solidFill>
+                <a:srgbClr val="597B78"/>
+              </a:solidFill>
+            </a:endParaRPr>
+          </a:p>
+        </p:txBody>
+      </p:sp>
+      <p:sp>
+        <p:nvSpPr>
+          <p:cNvPr id="22" name="Isosceles Triangle 102">
+            <a:extLst>
+              <a:ext uri="{FF2B5EF4-FFF2-40B4-BE49-F238E27FC236}">
+                <a16:creationId xmlns:a16="http://schemas.microsoft.com/office/drawing/2014/main" id="{365DB3E8-AC4C-4F4E-BE95-912E294B9992}"/>
+              </a:ext>
+            </a:extLst>
+          </p:cNvPr>
+          <p:cNvSpPr/>
+          <p:nvPr/>
+        </p:nvSpPr>
+        <p:spPr>
+          <a:xfrm rot="16200000">
+            <a:off x="1795012" y="3147415"/>
+            <a:ext cx="270504" cy="175523"/>
+          </a:xfrm>
+          <a:prstGeom prst="triangle">
+            <a:avLst/>
+          </a:prstGeom>
+          <a:solidFill>
+            <a:srgbClr val="597B78"/>
+          </a:solidFill>
+          <a:ln w="19050">
+            <a:solidFill>
+              <a:srgbClr val="597B78"/>
+            </a:solidFill>
+          </a:ln>
+          <a:effectLst/>
+        </p:spPr>
+        <p:style>
+          <a:lnRef idx="1">
+            <a:schemeClr val="accent6"/>
+          </a:lnRef>
+          <a:fillRef idx="2">
+            <a:schemeClr val="accent6"/>
+          </a:fillRef>
+          <a:effectRef idx="1">
+            <a:schemeClr val="accent6"/>
+          </a:effectRef>
+          <a:fontRef idx="minor">
+            <a:schemeClr val="dk1"/>
+          </a:fontRef>
+        </p:style>
+        <p:txBody>
+          <a:bodyPr rtlCol="0" anchor="ctr"/>
+          <a:lstStyle/>
+          <a:p>
+            <a:pPr algn="ctr"/>
+            <a:endParaRPr lang="en-SG" sz="1050">
+              <a:solidFill>
+                <a:srgbClr val="597B78"/>
+              </a:solidFill>
+            </a:endParaRPr>
+          </a:p>
+        </p:txBody>
+      </p:sp>
+      <p:cxnSp>
+        <p:nvCxnSpPr>
+          <p:cNvPr id="23" name="Straight Connector 22">
+            <a:extLst>
+              <a:ext uri="{FF2B5EF4-FFF2-40B4-BE49-F238E27FC236}">
+                <a16:creationId xmlns:a16="http://schemas.microsoft.com/office/drawing/2014/main" id="{6735349C-D785-44FE-A62A-D5F128604A06}"/>
+              </a:ext>
+            </a:extLst>
+          </p:cNvPr>
+          <p:cNvCxnSpPr>
+            <a:cxnSpLocks/>
+            <a:stCxn id="22" idx="3"/>
+          </p:cNvCxnSpPr>
+          <p:nvPr/>
+        </p:nvCxnSpPr>
+        <p:spPr>
+          <a:xfrm flipV="1">
+            <a:off x="2018026" y="3229706"/>
+            <a:ext cx="207476" cy="5471"/>
+          </a:xfrm>
+          <a:prstGeom prst="line">
+            <a:avLst/>
+          </a:prstGeom>
+          <a:ln w="19050">
+            <a:solidFill>
+              <a:srgbClr val="597B78"/>
+            </a:solidFill>
+            <a:prstDash val="sysDot"/>
+            <a:headEnd type="none" w="med" len="med"/>
+            <a:tailEnd type="none" w="med" len="med"/>
+          </a:ln>
+          <a:effectLst/>
+        </p:spPr>
+        <p:style>
+          <a:lnRef idx="1">
+            <a:schemeClr val="accent2"/>
+          </a:lnRef>
+          <a:fillRef idx="2">
+            <a:schemeClr val="accent2"/>
+          </a:fillRef>
+          <a:effectRef idx="1">
+            <a:schemeClr val="accent2"/>
+          </a:effectRef>
+          <a:fontRef idx="minor">
+            <a:schemeClr val="dk1"/>
+          </a:fontRef>
+        </p:style>
+      </p:cxnSp>
+      <p:cxnSp>
+        <p:nvCxnSpPr>
+          <p:cNvPr id="24" name="Straight Arrow Connector 23">
+            <a:extLst>
+              <a:ext uri="{FF2B5EF4-FFF2-40B4-BE49-F238E27FC236}">
+                <a16:creationId xmlns:a16="http://schemas.microsoft.com/office/drawing/2014/main" id="{9B7A24CB-45B0-41E9-9D6C-5813DF4A64D7}"/>
+              </a:ext>
+            </a:extLst>
+          </p:cNvPr>
+          <p:cNvCxnSpPr>
+            <a:cxnSpLocks/>
+            <a:stCxn id="25" idx="3"/>
+            <a:endCxn id="27" idx="1"/>
+          </p:cNvCxnSpPr>
+          <p:nvPr/>
+        </p:nvCxnSpPr>
+        <p:spPr>
+          <a:xfrm flipV="1">
+            <a:off x="3561321" y="3223984"/>
+            <a:ext cx="233298" cy="1428"/>
+          </a:xfrm>
+          <a:prstGeom prst="straightConnector1">
+            <a:avLst/>
+          </a:prstGeom>
+          <a:ln w="19050">
+            <a:solidFill>
+              <a:srgbClr val="597B78"/>
+            </a:solidFill>
+            <a:headEnd type="none" w="med" len="med"/>
+            <a:tailEnd type="arrow" w="med" len="med"/>
+          </a:ln>
+          <a:effectLst/>
+        </p:spPr>
+        <p:style>
+          <a:lnRef idx="1">
+            <a:schemeClr val="accent2"/>
+          </a:lnRef>
+          <a:fillRef idx="2">
+            <a:schemeClr val="accent2"/>
+          </a:fillRef>
+          <a:effectRef idx="1">
+            <a:schemeClr val="accent2"/>
+          </a:effectRef>
+          <a:fontRef idx="minor">
+            <a:schemeClr val="dk1"/>
+          </a:fontRef>
+        </p:style>
+      </p:cxnSp>
+      <p:sp>
+        <p:nvSpPr>
+          <p:cNvPr id="25" name="Flowchart: Decision 96">
+            <a:extLst>
+              <a:ext uri="{FF2B5EF4-FFF2-40B4-BE49-F238E27FC236}">
+                <a16:creationId xmlns:a16="http://schemas.microsoft.com/office/drawing/2014/main" id="{206A9DE9-0FD4-40CC-9294-3D0AEEFC157C}"/>
+              </a:ext>
+            </a:extLst>
+          </p:cNvPr>
+          <p:cNvSpPr/>
+          <p:nvPr/>
+        </p:nvSpPr>
+        <p:spPr>
+          <a:xfrm>
+            <a:off x="3345321" y="3117412"/>
+            <a:ext cx="216000" cy="216000"/>
+          </a:xfrm>
+          <a:prstGeom prst="flowChartDecision">
+            <a:avLst/>
+          </a:prstGeom>
+          <a:noFill/>
+          <a:ln w="19050">
+            <a:solidFill>
+              <a:srgbClr val="597B78"/>
+            </a:solidFill>
+          </a:ln>
+          <a:effectLst/>
+        </p:spPr>
+        <p:style>
+          <a:lnRef idx="1">
+            <a:schemeClr val="accent6"/>
+          </a:lnRef>
+          <a:fillRef idx="2">
+            <a:schemeClr val="accent6"/>
+          </a:fillRef>
+          <a:effectRef idx="1">
+            <a:schemeClr val="accent6"/>
+          </a:effectRef>
+          <a:fontRef idx="minor">
+            <a:schemeClr val="dk1"/>
+          </a:fontRef>
+        </p:style>
+        <p:txBody>
+          <a:bodyPr rtlCol="0" anchor="ctr"/>
+          <a:lstStyle/>
+          <a:p>
+            <a:pPr algn="ctr"/>
+            <a:endParaRPr lang="en-US" sz="1050">
+              <a:solidFill>
+                <a:srgbClr val="597B78"/>
+              </a:solidFill>
+            </a:endParaRPr>
+          </a:p>
+        </p:txBody>
+      </p:sp>
+      <p:sp>
+        <p:nvSpPr>
+          <p:cNvPr id="26" name="TextBox 25">
+            <a:extLst>
+              <a:ext uri="{FF2B5EF4-FFF2-40B4-BE49-F238E27FC236}">
+                <a16:creationId xmlns:a16="http://schemas.microsoft.com/office/drawing/2014/main" id="{CDD27E4B-3E21-4BC7-8CB5-CD4E2FBA118E}"/>
+              </a:ext>
+            </a:extLst>
+          </p:cNvPr>
+          <p:cNvSpPr txBox="1"/>
+          <p:nvPr/>
+        </p:nvSpPr>
+        <p:spPr>
+          <a:xfrm>
+            <a:off x="3616204" y="3274108"/>
+            <a:ext cx="189257" cy="178683"/>
+          </a:xfrm>
+          <a:prstGeom prst="rect">
+            <a:avLst/>
+          </a:prstGeom>
+          <a:noFill/>
+        </p:spPr>
+        <p:txBody>
+          <a:bodyPr wrap="square" lIns="0" tIns="0" rIns="0" bIns="0" rtlCol="0">
+            <a:noAutofit/>
+          </a:bodyPr>
+          <a:lstStyle/>
+          <a:p>
+            <a:pPr algn="ctr"/>
+            <a:r>
+              <a:rPr lang="en-US" sz="1100" dirty="0">
+                <a:solidFill>
+                  <a:srgbClr val="597B78"/>
+                </a:solidFill>
+              </a:rPr>
+              <a:t>1</a:t>
+            </a:r>
+            <a:endParaRPr lang="en-SG" sz="1100" dirty="0">
+              <a:solidFill>
+                <a:srgbClr val="597B78"/>
+              </a:solidFill>
+            </a:endParaRPr>
+          </a:p>
+        </p:txBody>
+      </p:sp>
+      <p:sp>
+        <p:nvSpPr>
+          <p:cNvPr id="27" name="Rectangle 8">
+            <a:extLst>
+              <a:ext uri="{FF2B5EF4-FFF2-40B4-BE49-F238E27FC236}">
+                <a16:creationId xmlns:a16="http://schemas.microsoft.com/office/drawing/2014/main" id="{D6832160-4177-4296-A5D2-39FE94C63F5E}"/>
+              </a:ext>
+            </a:extLst>
+          </p:cNvPr>
+          <p:cNvSpPr/>
+          <p:nvPr/>
+        </p:nvSpPr>
+        <p:spPr>
+          <a:xfrm>
+            <a:off x="3794619" y="3082580"/>
+            <a:ext cx="790812" cy="282808"/>
+          </a:xfrm>
+          <a:prstGeom prst="rect">
+            <a:avLst/>
+          </a:prstGeom>
+          <a:gradFill flip="none" rotWithShape="1">
+            <a:gsLst>
+              <a:gs pos="0">
+                <a:srgbClr val="BED0CF">
+                  <a:tint val="66000"/>
+                  <a:satMod val="160000"/>
+                </a:srgbClr>
+              </a:gs>
+              <a:gs pos="50000">
+                <a:srgbClr val="BED0CF">
+                  <a:tint val="44500"/>
+                  <a:satMod val="160000"/>
+                </a:srgbClr>
+              </a:gs>
+              <a:gs pos="100000">
+                <a:srgbClr val="BED0CF">
+                  <a:tint val="23500"/>
+                  <a:satMod val="160000"/>
+                </a:srgbClr>
+              </a:gs>
+            </a:gsLst>
+            <a:lin ang="16200000" scaled="1"/>
+            <a:tileRect/>
+          </a:gradFill>
+          <a:ln w="19050">
+            <a:solidFill>
+              <a:srgbClr val="597B78"/>
+            </a:solidFill>
+          </a:ln>
+          <a:effectLst/>
+        </p:spPr>
+        <p:style>
+          <a:lnRef idx="1">
+            <a:schemeClr val="accent4"/>
+          </a:lnRef>
+          <a:fillRef idx="2">
+            <a:schemeClr val="accent4"/>
+          </a:fillRef>
+          <a:effectRef idx="1">
+            <a:schemeClr val="accent4"/>
+          </a:effectRef>
+          <a:fontRef idx="minor">
+            <a:schemeClr val="dk1"/>
+          </a:fontRef>
+        </p:style>
+        <p:txBody>
+          <a:bodyPr rtlCol="0" anchor="ctr"/>
+          <a:lstStyle/>
+          <a:p>
+            <a:pPr algn="ctr"/>
+            <a:r>
+              <a:rPr lang="en-US" sz="1050" dirty="0">
+                <a:solidFill>
+                  <a:srgbClr val="597B78"/>
+                </a:solidFill>
+              </a:rPr>
+              <a:t>Session</a:t>
+            </a:r>
+            <a:endParaRPr lang="en-SG" sz="1050" dirty="0">
+              <a:solidFill>
+                <a:srgbClr val="597B78"/>
+              </a:solidFill>
+            </a:endParaRPr>
+          </a:p>
+        </p:txBody>
+      </p:sp>
+      <p:sp>
+        <p:nvSpPr>
+          <p:cNvPr id="28" name="Rectangle 8">
+            <a:extLst>
+              <a:ext uri="{FF2B5EF4-FFF2-40B4-BE49-F238E27FC236}">
+                <a16:creationId xmlns:a16="http://schemas.microsoft.com/office/drawing/2014/main" id="{18D896D9-6754-4AC7-9A42-834C9292B3BA}"/>
+              </a:ext>
+            </a:extLst>
+          </p:cNvPr>
+          <p:cNvSpPr/>
+          <p:nvPr/>
+        </p:nvSpPr>
+        <p:spPr>
+          <a:xfrm>
+            <a:off x="5065445" y="3080612"/>
+            <a:ext cx="698200" cy="282808"/>
+          </a:xfrm>
+          <a:prstGeom prst="rect">
+            <a:avLst/>
+          </a:prstGeom>
+          <a:gradFill flip="none" rotWithShape="1">
+            <a:gsLst>
+              <a:gs pos="0">
+                <a:srgbClr val="BED0CF">
+                  <a:tint val="66000"/>
+                  <a:satMod val="160000"/>
+                </a:srgbClr>
+              </a:gs>
+              <a:gs pos="50000">
+                <a:srgbClr val="BED0CF">
+                  <a:tint val="44500"/>
+                  <a:satMod val="160000"/>
+                </a:srgbClr>
+              </a:gs>
+              <a:gs pos="100000">
+                <a:srgbClr val="BED0CF">
+                  <a:tint val="23500"/>
+                  <a:satMod val="160000"/>
+                </a:srgbClr>
+              </a:gs>
+            </a:gsLst>
+            <a:lin ang="16200000" scaled="1"/>
+            <a:tileRect/>
+          </a:gradFill>
+          <a:ln w="19050">
+            <a:solidFill>
+              <a:srgbClr val="597B78"/>
+            </a:solidFill>
+          </a:ln>
+          <a:effectLst/>
+        </p:spPr>
+        <p:style>
+          <a:lnRef idx="1">
+            <a:schemeClr val="accent4"/>
+          </a:lnRef>
+          <a:fillRef idx="2">
+            <a:schemeClr val="accent4"/>
+          </a:fillRef>
+          <a:effectRef idx="1">
+            <a:schemeClr val="accent4"/>
+          </a:effectRef>
+          <a:fontRef idx="minor">
+            <a:schemeClr val="dk1"/>
+          </a:fontRef>
+        </p:style>
+        <p:txBody>
+          <a:bodyPr rtlCol="0" anchor="ctr"/>
+          <a:lstStyle/>
+          <a:p>
+            <a:pPr algn="ctr"/>
+            <a:r>
+              <a:rPr lang="en-US" sz="1050" dirty="0" err="1">
+                <a:solidFill>
+                  <a:srgbClr val="597B78"/>
+                </a:solidFill>
+              </a:rPr>
+              <a:t>SrsCard</a:t>
+            </a:r>
+            <a:endParaRPr lang="en-SG" sz="1050" dirty="0">
+              <a:solidFill>
+                <a:srgbClr val="597B78"/>
+              </a:solidFill>
+            </a:endParaRPr>
+          </a:p>
+        </p:txBody>
+      </p:sp>
+      <p:sp>
+        <p:nvSpPr>
+          <p:cNvPr id="29" name="Flowchart: Decision 96">
+            <a:extLst>
+              <a:ext uri="{FF2B5EF4-FFF2-40B4-BE49-F238E27FC236}">
+                <a16:creationId xmlns:a16="http://schemas.microsoft.com/office/drawing/2014/main" id="{4C017955-09FB-4077-BE16-EF592F9E48E6}"/>
+              </a:ext>
+            </a:extLst>
+          </p:cNvPr>
+          <p:cNvSpPr/>
+          <p:nvPr/>
+        </p:nvSpPr>
+        <p:spPr>
+          <a:xfrm>
+            <a:off x="4591471" y="3115984"/>
+            <a:ext cx="216000" cy="216000"/>
+          </a:xfrm>
+          <a:prstGeom prst="flowChartDecision">
+            <a:avLst/>
+          </a:prstGeom>
+          <a:solidFill>
+            <a:srgbClr val="597B78"/>
+          </a:solidFill>
+          <a:ln w="19050">
+            <a:solidFill>
+              <a:srgbClr val="597B78"/>
+            </a:solidFill>
+          </a:ln>
+          <a:effectLst/>
+        </p:spPr>
+        <p:style>
+          <a:lnRef idx="1">
+            <a:schemeClr val="accent6"/>
+          </a:lnRef>
+          <a:fillRef idx="2">
+            <a:schemeClr val="accent6"/>
+          </a:fillRef>
+          <a:effectRef idx="1">
+            <a:schemeClr val="accent6"/>
+          </a:effectRef>
+          <a:fontRef idx="minor">
+            <a:schemeClr val="dk1"/>
+          </a:fontRef>
+        </p:style>
+        <p:txBody>
+          <a:bodyPr rtlCol="0" anchor="ctr"/>
+          <a:lstStyle/>
+          <a:p>
+            <a:pPr algn="ctr"/>
+            <a:endParaRPr lang="en-US" sz="1050">
+              <a:solidFill>
+                <a:srgbClr val="597B78"/>
+              </a:solidFill>
+            </a:endParaRPr>
+          </a:p>
+        </p:txBody>
+      </p:sp>
+      <p:cxnSp>
+        <p:nvCxnSpPr>
+          <p:cNvPr id="30" name="Elbow Connector 63">
+            <a:extLst>
+              <a:ext uri="{FF2B5EF4-FFF2-40B4-BE49-F238E27FC236}">
+                <a16:creationId xmlns:a16="http://schemas.microsoft.com/office/drawing/2014/main" id="{FE181668-9144-4468-ABB0-D1B3CA9FB5B2}"/>
+              </a:ext>
+            </a:extLst>
+          </p:cNvPr>
+          <p:cNvCxnSpPr>
+            <a:cxnSpLocks/>
+            <a:stCxn id="29" idx="3"/>
+            <a:endCxn id="28" idx="1"/>
+          </p:cNvCxnSpPr>
+          <p:nvPr/>
+        </p:nvCxnSpPr>
+        <p:spPr>
+          <a:xfrm flipV="1">
+            <a:off x="4807471" y="3222016"/>
+            <a:ext cx="257974" cy="1968"/>
+          </a:xfrm>
+          <a:prstGeom prst="straightConnector1">
+            <a:avLst/>
+          </a:prstGeom>
+          <a:ln w="19050">
+            <a:solidFill>
+              <a:srgbClr val="597B78"/>
+            </a:solidFill>
+            <a:headEnd type="none" w="med" len="med"/>
+            <a:tailEnd type="arrow" w="med" len="med"/>
+          </a:ln>
+          <a:effectLst/>
+        </p:spPr>
+        <p:style>
+          <a:lnRef idx="1">
+            <a:schemeClr val="accent2"/>
+          </a:lnRef>
+          <a:fillRef idx="2">
+            <a:schemeClr val="accent2"/>
+          </a:fillRef>
+          <a:effectRef idx="1">
+            <a:schemeClr val="accent2"/>
+          </a:effectRef>
+          <a:fontRef idx="minor">
+            <a:schemeClr val="dk1"/>
+          </a:fontRef>
+        </p:style>
+      </p:cxnSp>
+      <p:sp>
+        <p:nvSpPr>
+          <p:cNvPr id="31" name="TextBox 30">
+            <a:extLst>
+              <a:ext uri="{FF2B5EF4-FFF2-40B4-BE49-F238E27FC236}">
+                <a16:creationId xmlns:a16="http://schemas.microsoft.com/office/drawing/2014/main" id="{074B6BD6-1D7D-4641-936E-427FC1C157A5}"/>
+              </a:ext>
+            </a:extLst>
+          </p:cNvPr>
+          <p:cNvSpPr txBox="1"/>
+          <p:nvPr/>
+        </p:nvSpPr>
+        <p:spPr>
+          <a:xfrm>
+            <a:off x="4876800" y="3290769"/>
+            <a:ext cx="189257" cy="178683"/>
+          </a:xfrm>
+          <a:prstGeom prst="rect">
+            <a:avLst/>
+          </a:prstGeom>
+          <a:noFill/>
+          <a:ln>
+            <a:noFill/>
+          </a:ln>
+        </p:spPr>
+        <p:txBody>
+          <a:bodyPr wrap="square" lIns="0" tIns="0" rIns="0" bIns="0" rtlCol="0">
+            <a:noAutofit/>
+          </a:bodyPr>
+          <a:lstStyle/>
+          <a:p>
+            <a:pPr algn="ctr"/>
+            <a:r>
+              <a:rPr lang="en-US" sz="1100" dirty="0">
+                <a:solidFill>
+                  <a:srgbClr val="597B78"/>
+                </a:solidFill>
+              </a:rPr>
+              <a:t>1..</a:t>
+            </a:r>
+            <a:endParaRPr lang="en-SG" sz="1100" dirty="0">
+              <a:solidFill>
+                <a:srgbClr val="597B78"/>
+              </a:solidFill>
+            </a:endParaRPr>
+          </a:p>
+        </p:txBody>
+      </p:sp>
+      <p:cxnSp>
+        <p:nvCxnSpPr>
+          <p:cNvPr id="32" name="Straight Arrow Connector 31">
+            <a:extLst>
+              <a:ext uri="{FF2B5EF4-FFF2-40B4-BE49-F238E27FC236}">
+                <a16:creationId xmlns:a16="http://schemas.microsoft.com/office/drawing/2014/main" id="{4F0BD24D-10B5-4478-BF47-0778D0A6D921}"/>
+              </a:ext>
+            </a:extLst>
+          </p:cNvPr>
+          <p:cNvCxnSpPr>
+            <a:cxnSpLocks/>
+            <a:stCxn id="33" idx="3"/>
+            <a:endCxn id="35" idx="1"/>
+          </p:cNvCxnSpPr>
+          <p:nvPr/>
+        </p:nvCxnSpPr>
+        <p:spPr>
+          <a:xfrm>
+            <a:off x="3558338" y="3734754"/>
+            <a:ext cx="233297" cy="0"/>
+          </a:xfrm>
+          <a:prstGeom prst="straightConnector1">
+            <a:avLst/>
+          </a:prstGeom>
+          <a:ln w="19050">
+            <a:solidFill>
+              <a:srgbClr val="597B78"/>
+            </a:solidFill>
+            <a:headEnd type="none" w="med" len="med"/>
+            <a:tailEnd type="arrow" w="med" len="med"/>
+          </a:ln>
+          <a:effectLst/>
+        </p:spPr>
+        <p:style>
+          <a:lnRef idx="1">
+            <a:schemeClr val="accent2"/>
+          </a:lnRef>
+          <a:fillRef idx="2">
+            <a:schemeClr val="accent2"/>
+          </a:fillRef>
+          <a:effectRef idx="1">
+            <a:schemeClr val="accent2"/>
+          </a:effectRef>
+          <a:fontRef idx="minor">
+            <a:schemeClr val="dk1"/>
+          </a:fontRef>
+        </p:style>
+      </p:cxnSp>
+      <p:sp>
+        <p:nvSpPr>
+          <p:cNvPr id="33" name="Flowchart: Decision 96">
+            <a:extLst>
+              <a:ext uri="{FF2B5EF4-FFF2-40B4-BE49-F238E27FC236}">
+                <a16:creationId xmlns:a16="http://schemas.microsoft.com/office/drawing/2014/main" id="{53FB2A32-D4A5-4FA8-80F3-7EFA5AFF4E80}"/>
+              </a:ext>
+            </a:extLst>
+          </p:cNvPr>
+          <p:cNvSpPr/>
+          <p:nvPr/>
+        </p:nvSpPr>
+        <p:spPr>
+          <a:xfrm>
+            <a:off x="3342338" y="3626754"/>
+            <a:ext cx="216000" cy="216000"/>
+          </a:xfrm>
+          <a:prstGeom prst="flowChartDecision">
+            <a:avLst/>
+          </a:prstGeom>
+          <a:noFill/>
+          <a:ln w="19050">
+            <a:solidFill>
+              <a:srgbClr val="597B78"/>
+            </a:solidFill>
+          </a:ln>
+          <a:effectLst/>
+        </p:spPr>
+        <p:style>
+          <a:lnRef idx="1">
+            <a:schemeClr val="accent6"/>
+          </a:lnRef>
+          <a:fillRef idx="2">
+            <a:schemeClr val="accent6"/>
+          </a:fillRef>
+          <a:effectRef idx="1">
+            <a:schemeClr val="accent6"/>
+          </a:effectRef>
+          <a:fontRef idx="minor">
+            <a:schemeClr val="dk1"/>
+          </a:fontRef>
+        </p:style>
+        <p:txBody>
+          <a:bodyPr rtlCol="0" anchor="ctr"/>
+          <a:lstStyle/>
+          <a:p>
+            <a:pPr algn="ctr"/>
+            <a:endParaRPr lang="en-US" sz="1050">
+              <a:solidFill>
+                <a:srgbClr val="597B78"/>
+              </a:solidFill>
+            </a:endParaRPr>
+          </a:p>
+        </p:txBody>
+      </p:sp>
+      <p:sp>
+        <p:nvSpPr>
+          <p:cNvPr id="34" name="TextBox 33">
+            <a:extLst>
+              <a:ext uri="{FF2B5EF4-FFF2-40B4-BE49-F238E27FC236}">
+                <a16:creationId xmlns:a16="http://schemas.microsoft.com/office/drawing/2014/main" id="{60B985CA-0A76-42D8-B737-8C442B18FCD2}"/>
+              </a:ext>
+            </a:extLst>
+          </p:cNvPr>
+          <p:cNvSpPr txBox="1"/>
+          <p:nvPr/>
+        </p:nvSpPr>
+        <p:spPr>
+          <a:xfrm>
+            <a:off x="3613221" y="3783450"/>
+            <a:ext cx="189257" cy="178683"/>
+          </a:xfrm>
+          <a:prstGeom prst="rect">
+            <a:avLst/>
+          </a:prstGeom>
+          <a:noFill/>
+        </p:spPr>
+        <p:txBody>
+          <a:bodyPr wrap="square" lIns="0" tIns="0" rIns="0" bIns="0" rtlCol="0">
+            <a:noAutofit/>
+          </a:bodyPr>
+          <a:lstStyle/>
+          <a:p>
+            <a:pPr algn="ctr"/>
+            <a:r>
+              <a:rPr lang="en-US" sz="1100" dirty="0">
+                <a:solidFill>
+                  <a:srgbClr val="597B78"/>
+                </a:solidFill>
+              </a:rPr>
+              <a:t>1</a:t>
+            </a:r>
+            <a:endParaRPr lang="en-SG" sz="1100" dirty="0">
+              <a:solidFill>
+                <a:srgbClr val="597B78"/>
+              </a:solidFill>
+            </a:endParaRPr>
+          </a:p>
+        </p:txBody>
+      </p:sp>
+      <p:sp>
+        <p:nvSpPr>
+          <p:cNvPr id="35" name="Rectangle 8">
+            <a:extLst>
+              <a:ext uri="{FF2B5EF4-FFF2-40B4-BE49-F238E27FC236}">
+                <a16:creationId xmlns:a16="http://schemas.microsoft.com/office/drawing/2014/main" id="{A8BAEB94-8A75-492A-B233-71634E95CCE5}"/>
+              </a:ext>
+            </a:extLst>
+          </p:cNvPr>
+          <p:cNvSpPr/>
+          <p:nvPr/>
+        </p:nvSpPr>
+        <p:spPr>
+          <a:xfrm>
+            <a:off x="3791635" y="3569002"/>
+            <a:ext cx="982173" cy="331504"/>
+          </a:xfrm>
+          <a:prstGeom prst="rect">
+            <a:avLst/>
+          </a:prstGeom>
+          <a:gradFill flip="none" rotWithShape="1">
+            <a:gsLst>
+              <a:gs pos="0">
+                <a:srgbClr val="BED0CF">
+                  <a:tint val="66000"/>
+                  <a:satMod val="160000"/>
+                </a:srgbClr>
+              </a:gs>
+              <a:gs pos="50000">
+                <a:srgbClr val="BED0CF">
+                  <a:tint val="44500"/>
+                  <a:satMod val="160000"/>
+                </a:srgbClr>
+              </a:gs>
+              <a:gs pos="100000">
+                <a:srgbClr val="BED0CF">
+                  <a:tint val="23500"/>
+                  <a:satMod val="160000"/>
+                </a:srgbClr>
+              </a:gs>
+            </a:gsLst>
+            <a:lin ang="16200000" scaled="1"/>
+            <a:tileRect/>
+          </a:gradFill>
+          <a:ln w="19050">
+            <a:solidFill>
+              <a:srgbClr val="597B78"/>
+            </a:solidFill>
+          </a:ln>
+          <a:effectLst/>
+        </p:spPr>
+        <p:style>
+          <a:lnRef idx="1">
+            <a:schemeClr val="accent4"/>
+          </a:lnRef>
+          <a:fillRef idx="2">
+            <a:schemeClr val="accent4"/>
+          </a:fillRef>
+          <a:effectRef idx="1">
+            <a:schemeClr val="accent4"/>
+          </a:effectRef>
+          <a:fontRef idx="minor">
+            <a:schemeClr val="dk1"/>
+          </a:fontRef>
+        </p:style>
+        <p:txBody>
+          <a:bodyPr rtlCol="0" anchor="ctr"/>
+          <a:lstStyle/>
+          <a:p>
+            <a:pPr algn="ctr"/>
+            <a:r>
+              <a:rPr lang="en-US" sz="1050" dirty="0" err="1">
+                <a:solidFill>
+                  <a:srgbClr val="597B78"/>
+                </a:solidFill>
+              </a:rPr>
+              <a:t>QuizUiDisplayFormatter</a:t>
+            </a:r>
+            <a:endParaRPr lang="en-SG" sz="1050" dirty="0">
+              <a:solidFill>
+                <a:srgbClr val="597B78"/>
+              </a:solidFill>
+            </a:endParaRPr>
+          </a:p>
+        </p:txBody>
+      </p:sp>
+      <p:grpSp>
+        <p:nvGrpSpPr>
+          <p:cNvPr id="61" name="Group 60">
+            <a:extLst>
+              <a:ext uri="{FF2B5EF4-FFF2-40B4-BE49-F238E27FC236}">
+                <a16:creationId xmlns:a16="http://schemas.microsoft.com/office/drawing/2014/main" id="{0B449FCB-EF63-4AAD-ADA9-67511FA36845}"/>
+              </a:ext>
+            </a:extLst>
+          </p:cNvPr>
+          <p:cNvGrpSpPr/>
+          <p:nvPr/>
+        </p:nvGrpSpPr>
+        <p:grpSpPr>
+          <a:xfrm rot="16200000">
+            <a:off x="2944188" y="2250717"/>
+            <a:ext cx="454604" cy="216000"/>
+            <a:chOff x="2618285" y="1438790"/>
+            <a:chExt cx="454604" cy="216000"/>
+          </a:xfrm>
+        </p:grpSpPr>
+        <p:cxnSp>
+          <p:nvCxnSpPr>
+            <p:cNvPr id="40" name="Straight Arrow Connector 39">
+              <a:extLst>
+                <a:ext uri="{FF2B5EF4-FFF2-40B4-BE49-F238E27FC236}">
+                  <a16:creationId xmlns:a16="http://schemas.microsoft.com/office/drawing/2014/main" id="{6F187A06-2033-4C0C-91E2-C0C3FCB0A53F}"/>
+                </a:ext>
+              </a:extLst>
+            </p:cNvPr>
+            <p:cNvCxnSpPr>
+              <a:cxnSpLocks/>
+              <a:stCxn id="41" idx="3"/>
+              <a:endCxn id="43" idx="2"/>
+            </p:cNvCxnSpPr>
+            <p:nvPr/>
+          </p:nvCxnSpPr>
+          <p:spPr>
+            <a:xfrm rot="5400000" flipV="1">
+              <a:off x="2953587" y="1427488"/>
+              <a:ext cx="0" cy="238605"/>
+            </a:xfrm>
+            <a:prstGeom prst="straightConnector1">
+              <a:avLst/>
+            </a:prstGeom>
+            <a:ln w="19050">
+              <a:solidFill>
+                <a:srgbClr val="597B78"/>
+              </a:solidFill>
+              <a:headEnd type="none" w="med" len="med"/>
+              <a:tailEnd type="arrow" w="med" len="med"/>
+            </a:ln>
+            <a:effectLst/>
+          </p:spPr>
+          <p:style>
+            <a:lnRef idx="1">
+              <a:schemeClr val="accent2"/>
+            </a:lnRef>
+            <a:fillRef idx="2">
+              <a:schemeClr val="accent2"/>
+            </a:fillRef>
+            <a:effectRef idx="1">
+              <a:schemeClr val="accent2"/>
+            </a:effectRef>
+            <a:fontRef idx="minor">
+              <a:schemeClr val="dk1"/>
+            </a:fontRef>
+          </p:style>
+        </p:cxnSp>
+        <p:sp>
+          <p:nvSpPr>
+            <p:cNvPr id="41" name="Flowchart: Decision 96">
+              <a:extLst>
+                <a:ext uri="{FF2B5EF4-FFF2-40B4-BE49-F238E27FC236}">
+                  <a16:creationId xmlns:a16="http://schemas.microsoft.com/office/drawing/2014/main" id="{6C7B7E57-6CE4-43DC-935C-D25670D236B2}"/>
+                </a:ext>
+              </a:extLst>
+            </p:cNvPr>
+            <p:cNvSpPr/>
+            <p:nvPr/>
+          </p:nvSpPr>
+          <p:spPr>
+            <a:xfrm>
+              <a:off x="2618285" y="1438790"/>
+              <a:ext cx="216000" cy="216000"/>
+            </a:xfrm>
+            <a:prstGeom prst="flowChartDecision">
+              <a:avLst/>
+            </a:prstGeom>
+            <a:noFill/>
+            <a:ln w="19050">
+              <a:solidFill>
+                <a:srgbClr val="597B78"/>
+              </a:solidFill>
+            </a:ln>
+            <a:effectLst/>
+          </p:spPr>
+          <p:style>
+            <a:lnRef idx="1">
+              <a:schemeClr val="accent6"/>
+            </a:lnRef>
+            <a:fillRef idx="2">
+              <a:schemeClr val="accent6"/>
+            </a:fillRef>
+            <a:effectRef idx="1">
+              <a:schemeClr val="accent6"/>
+            </a:effectRef>
+            <a:fontRef idx="minor">
+              <a:schemeClr val="dk1"/>
+            </a:fontRef>
+          </p:style>
+          <p:txBody>
+            <a:bodyPr rtlCol="0" anchor="ctr"/>
+            <a:lstStyle/>
+            <a:p>
+              <a:pPr algn="ctr"/>
+              <a:endParaRPr lang="en-US" sz="1050">
+                <a:solidFill>
+                  <a:srgbClr val="597B78"/>
+                </a:solidFill>
+              </a:endParaRPr>
+            </a:p>
+          </p:txBody>
+        </p:sp>
+      </p:grpSp>
+      <p:sp>
+        <p:nvSpPr>
+          <p:cNvPr id="42" name="TextBox 41">
+            <a:extLst>
+              <a:ext uri="{FF2B5EF4-FFF2-40B4-BE49-F238E27FC236}">
+                <a16:creationId xmlns:a16="http://schemas.microsoft.com/office/drawing/2014/main" id="{7E46D3EB-7AB1-45F8-AD96-F34BEF7CB0B4}"/>
+              </a:ext>
+            </a:extLst>
+          </p:cNvPr>
+          <p:cNvSpPr txBox="1"/>
+          <p:nvPr/>
+        </p:nvSpPr>
+        <p:spPr>
+          <a:xfrm>
+            <a:off x="3191101" y="2126861"/>
+            <a:ext cx="189257" cy="178683"/>
+          </a:xfrm>
+          <a:prstGeom prst="rect">
+            <a:avLst/>
+          </a:prstGeom>
+          <a:noFill/>
+        </p:spPr>
+        <p:txBody>
+          <a:bodyPr wrap="square" lIns="0" tIns="0" rIns="0" bIns="0" rtlCol="0">
+            <a:noAutofit/>
+          </a:bodyPr>
+          <a:lstStyle/>
+          <a:p>
+            <a:pPr algn="ctr"/>
+            <a:r>
+              <a:rPr lang="en-US" sz="1100" dirty="0">
+                <a:solidFill>
+                  <a:srgbClr val="597B78"/>
+                </a:solidFill>
+              </a:rPr>
+              <a:t>1</a:t>
+            </a:r>
+            <a:endParaRPr lang="en-SG" sz="1100" dirty="0">
+              <a:solidFill>
+                <a:srgbClr val="597B78"/>
+              </a:solidFill>
+            </a:endParaRPr>
+          </a:p>
+        </p:txBody>
+      </p:sp>
+      <p:sp>
+        <p:nvSpPr>
+          <p:cNvPr id="43" name="Rectangle 8">
+            <a:extLst>
+              <a:ext uri="{FF2B5EF4-FFF2-40B4-BE49-F238E27FC236}">
+                <a16:creationId xmlns:a16="http://schemas.microsoft.com/office/drawing/2014/main" id="{4D3C1E3D-A3A0-46E3-8E74-38A7F160AD2C}"/>
+              </a:ext>
+            </a:extLst>
+          </p:cNvPr>
+          <p:cNvSpPr/>
+          <p:nvPr/>
+        </p:nvSpPr>
+        <p:spPr>
+          <a:xfrm>
+            <a:off x="2660552" y="1790826"/>
+            <a:ext cx="1021875" cy="340588"/>
+          </a:xfrm>
+          <a:prstGeom prst="rect">
+            <a:avLst/>
+          </a:prstGeom>
+          <a:solidFill>
+            <a:srgbClr val="7030A0"/>
+          </a:solidFill>
+          <a:ln w="19050">
+            <a:noFill/>
+          </a:ln>
+          <a:effectLst/>
+        </p:spPr>
+        <p:style>
+          <a:lnRef idx="1">
+            <a:schemeClr val="accent4"/>
+          </a:lnRef>
+          <a:fillRef idx="2">
+            <a:schemeClr val="accent4"/>
+          </a:fillRef>
+          <a:effectRef idx="1">
+            <a:schemeClr val="accent4"/>
+          </a:effectRef>
+          <a:fontRef idx="minor">
+            <a:schemeClr val="dk1"/>
+          </a:fontRef>
+        </p:style>
+        <p:txBody>
+          <a:bodyPr rtlCol="0" anchor="ctr"/>
+          <a:lstStyle/>
+          <a:p>
+            <a:pPr algn="ctr"/>
+            <a:r>
+              <a:rPr lang="en-US" sz="1050" dirty="0" err="1">
+                <a:solidFill>
+                  <a:schemeClr val="bg1"/>
+                </a:solidFill>
+              </a:rPr>
+              <a:t>ManagementModelManager</a:t>
+            </a:r>
+            <a:endParaRPr lang="en-SG" sz="1050" dirty="0">
+              <a:solidFill>
+                <a:schemeClr val="bg1"/>
+              </a:solidFill>
+            </a:endParaRPr>
+          </a:p>
+        </p:txBody>
+      </p:sp>
     </p:spTree>
     <p:extLst>
       <p:ext uri="{BB962C8B-B14F-4D97-AF65-F5344CB8AC3E}">

</xml_diff>

<commit_message>
Updating UGDG for quiz mode
</commit_message>
<xml_diff>
--- a/docs/diagrams/QuizModelComponentClassDiagram.pptx
+++ b/docs/diagrams/QuizModelComponentClassDiagram.pptx
@@ -208,7 +208,7 @@
           <a:p>
             <a:fld id="{F5CC4B3F-88C1-4FFA-B1B6-F41C21DC6924}" type="datetimeFigureOut">
               <a:rPr lang="en-US" smtClean="0"/>
-              <a:t>4/2/2019</a:t>
+              <a:t>4/11/2019</a:t>
             </a:fld>
             <a:endParaRPr lang="en-US"/>
           </a:p>
@@ -654,7 +654,7 @@
           <a:p>
             <a:fld id="{78C97017-6FC3-485B-9764-EAC9E56C1D49}" type="datetimeFigureOut">
               <a:rPr lang="en-US" smtClean="0"/>
-              <a:t>4/2/2019</a:t>
+              <a:t>4/11/2019</a:t>
             </a:fld>
             <a:endParaRPr lang="en-US"/>
           </a:p>
@@ -822,7 +822,7 @@
           <a:p>
             <a:fld id="{78C97017-6FC3-485B-9764-EAC9E56C1D49}" type="datetimeFigureOut">
               <a:rPr lang="en-US" smtClean="0"/>
-              <a:t>4/2/2019</a:t>
+              <a:t>4/11/2019</a:t>
             </a:fld>
             <a:endParaRPr lang="en-US"/>
           </a:p>
@@ -1000,7 +1000,7 @@
           <a:p>
             <a:fld id="{78C97017-6FC3-485B-9764-EAC9E56C1D49}" type="datetimeFigureOut">
               <a:rPr lang="en-US" smtClean="0"/>
-              <a:t>4/2/2019</a:t>
+              <a:t>4/11/2019</a:t>
             </a:fld>
             <a:endParaRPr lang="en-US"/>
           </a:p>
@@ -1168,7 +1168,7 @@
           <a:p>
             <a:fld id="{78C97017-6FC3-485B-9764-EAC9E56C1D49}" type="datetimeFigureOut">
               <a:rPr lang="en-US" smtClean="0"/>
-              <a:t>4/2/2019</a:t>
+              <a:t>4/11/2019</a:t>
             </a:fld>
             <a:endParaRPr lang="en-US"/>
           </a:p>
@@ -1413,7 +1413,7 @@
           <a:p>
             <a:fld id="{78C97017-6FC3-485B-9764-EAC9E56C1D49}" type="datetimeFigureOut">
               <a:rPr lang="en-US" smtClean="0"/>
-              <a:t>4/2/2019</a:t>
+              <a:t>4/11/2019</a:t>
             </a:fld>
             <a:endParaRPr lang="en-US"/>
           </a:p>
@@ -1698,7 +1698,7 @@
           <a:p>
             <a:fld id="{78C97017-6FC3-485B-9764-EAC9E56C1D49}" type="datetimeFigureOut">
               <a:rPr lang="en-US" smtClean="0"/>
-              <a:t>4/2/2019</a:t>
+              <a:t>4/11/2019</a:t>
             </a:fld>
             <a:endParaRPr lang="en-US"/>
           </a:p>
@@ -2117,7 +2117,7 @@
           <a:p>
             <a:fld id="{78C97017-6FC3-485B-9764-EAC9E56C1D49}" type="datetimeFigureOut">
               <a:rPr lang="en-US" smtClean="0"/>
-              <a:t>4/2/2019</a:t>
+              <a:t>4/11/2019</a:t>
             </a:fld>
             <a:endParaRPr lang="en-US"/>
           </a:p>
@@ -2234,7 +2234,7 @@
           <a:p>
             <a:fld id="{78C97017-6FC3-485B-9764-EAC9E56C1D49}" type="datetimeFigureOut">
               <a:rPr lang="en-US" smtClean="0"/>
-              <a:t>4/2/2019</a:t>
+              <a:t>4/11/2019</a:t>
             </a:fld>
             <a:endParaRPr lang="en-US"/>
           </a:p>
@@ -2329,7 +2329,7 @@
           <a:p>
             <a:fld id="{78C97017-6FC3-485B-9764-EAC9E56C1D49}" type="datetimeFigureOut">
               <a:rPr lang="en-US" smtClean="0"/>
-              <a:t>4/2/2019</a:t>
+              <a:t>4/11/2019</a:t>
             </a:fld>
             <a:endParaRPr lang="en-US"/>
           </a:p>
@@ -2604,7 +2604,7 @@
           <a:p>
             <a:fld id="{78C97017-6FC3-485B-9764-EAC9E56C1D49}" type="datetimeFigureOut">
               <a:rPr lang="en-US" smtClean="0"/>
-              <a:t>4/2/2019</a:t>
+              <a:t>4/11/2019</a:t>
             </a:fld>
             <a:endParaRPr lang="en-US"/>
           </a:p>
@@ -2856,7 +2856,7 @@
           <a:p>
             <a:fld id="{78C97017-6FC3-485B-9764-EAC9E56C1D49}" type="datetimeFigureOut">
               <a:rPr lang="en-US" smtClean="0"/>
-              <a:t>4/2/2019</a:t>
+              <a:t>4/11/2019</a:t>
             </a:fld>
             <a:endParaRPr lang="en-US"/>
           </a:p>
@@ -3067,7 +3067,7 @@
           <a:p>
             <a:fld id="{78C97017-6FC3-485B-9764-EAC9E56C1D49}" type="datetimeFigureOut">
               <a:rPr lang="en-US" smtClean="0"/>
-              <a:t>4/2/2019</a:t>
+              <a:t>4/11/2019</a:t>
             </a:fld>
             <a:endParaRPr lang="en-US"/>
           </a:p>
@@ -3450,8 +3450,8 @@
         </p:nvSpPr>
         <p:spPr>
           <a:xfrm>
-            <a:off x="1278338" y="1162269"/>
-            <a:ext cx="6023159" cy="3025871"/>
+            <a:off x="549741" y="443175"/>
+            <a:ext cx="6155859" cy="2596245"/>
           </a:xfrm>
           <a:prstGeom prst="roundRect">
             <a:avLst>
@@ -3500,47 +3500,603 @@
           </a:p>
         </p:txBody>
       </p:sp>
-      <p:sp>
-        <p:nvSpPr>
-          <p:cNvPr id="9" name="Rectangle 62"/>
+      <p:cxnSp>
+        <p:nvCxnSpPr>
+          <p:cNvPr id="88" name="Straight Arrow Connector 87">
+            <a:extLst>
+              <a:ext uri="{FF2B5EF4-FFF2-40B4-BE49-F238E27FC236}">
+                <a16:creationId xmlns:a16="http://schemas.microsoft.com/office/drawing/2014/main" id="{C249130F-C4E5-4BF6-AD3B-372EDF6BE0CC}"/>
+              </a:ext>
+            </a:extLst>
+          </p:cNvPr>
+          <p:cNvCxnSpPr>
+            <a:cxnSpLocks/>
+            <a:stCxn id="89" idx="3"/>
+            <a:endCxn id="91" idx="1"/>
+          </p:cNvCxnSpPr>
+          <p:nvPr/>
+        </p:nvCxnSpPr>
+        <p:spPr>
+          <a:xfrm flipV="1">
+            <a:off x="2369812" y="2668210"/>
+            <a:ext cx="388888" cy="1787"/>
+          </a:xfrm>
+          <a:prstGeom prst="straightConnector1">
+            <a:avLst/>
+          </a:prstGeom>
+          <a:ln w="19050">
+            <a:solidFill>
+              <a:srgbClr val="0E5B5B"/>
+            </a:solidFill>
+            <a:headEnd type="none" w="med" len="med"/>
+            <a:tailEnd type="arrow" w="med" len="med"/>
+          </a:ln>
+          <a:effectLst/>
+        </p:spPr>
+        <p:style>
+          <a:lnRef idx="1">
+            <a:schemeClr val="accent2"/>
+          </a:lnRef>
+          <a:fillRef idx="2">
+            <a:schemeClr val="accent2"/>
+          </a:fillRef>
+          <a:effectRef idx="1">
+            <a:schemeClr val="accent2"/>
+          </a:effectRef>
+          <a:fontRef idx="minor">
+            <a:schemeClr val="dk1"/>
+          </a:fontRef>
+        </p:style>
+      </p:cxnSp>
+      <p:sp>
+        <p:nvSpPr>
+          <p:cNvPr id="89" name="Flowchart: Decision 96">
+            <a:extLst>
+              <a:ext uri="{FF2B5EF4-FFF2-40B4-BE49-F238E27FC236}">
+                <a16:creationId xmlns:a16="http://schemas.microsoft.com/office/drawing/2014/main" id="{958FB765-0710-45ED-A7DF-8420977E1407}"/>
+              </a:ext>
+            </a:extLst>
+          </p:cNvPr>
           <p:cNvSpPr/>
           <p:nvPr/>
         </p:nvSpPr>
         <p:spPr>
-          <a:xfrm rot="16200000">
-            <a:off x="2514265" y="3065119"/>
-            <a:ext cx="1295400" cy="346760"/>
+          <a:xfrm>
+            <a:off x="2153812" y="2561997"/>
+            <a:ext cx="216000" cy="216000"/>
+          </a:xfrm>
+          <a:prstGeom prst="flowChartDecision">
+            <a:avLst/>
+          </a:prstGeom>
+          <a:noFill/>
+          <a:ln w="19050">
+            <a:solidFill>
+              <a:srgbClr val="0E5B5B"/>
+            </a:solidFill>
+          </a:ln>
+          <a:effectLst/>
+        </p:spPr>
+        <p:style>
+          <a:lnRef idx="1">
+            <a:schemeClr val="accent6"/>
+          </a:lnRef>
+          <a:fillRef idx="2">
+            <a:schemeClr val="accent6"/>
+          </a:fillRef>
+          <a:effectRef idx="1">
+            <a:schemeClr val="accent6"/>
+          </a:effectRef>
+          <a:fontRef idx="minor">
+            <a:schemeClr val="dk1"/>
+          </a:fontRef>
+        </p:style>
+        <p:txBody>
+          <a:bodyPr rtlCol="0" anchor="ctr"/>
+          <a:lstStyle/>
+          <a:p>
+            <a:pPr algn="ctr"/>
+            <a:endParaRPr lang="en-US" sz="1050">
+              <a:solidFill>
+                <a:srgbClr val="597B78"/>
+              </a:solidFill>
+            </a:endParaRPr>
+          </a:p>
+        </p:txBody>
+      </p:sp>
+      <p:sp>
+        <p:nvSpPr>
+          <p:cNvPr id="91" name="Rectangle 8">
+            <a:extLst>
+              <a:ext uri="{FF2B5EF4-FFF2-40B4-BE49-F238E27FC236}">
+                <a16:creationId xmlns:a16="http://schemas.microsoft.com/office/drawing/2014/main" id="{647B1DA6-44B2-469D-8297-C18F1D4BBDFD}"/>
+              </a:ext>
+            </a:extLst>
+          </p:cNvPr>
+          <p:cNvSpPr/>
+          <p:nvPr/>
+        </p:nvSpPr>
+        <p:spPr>
+          <a:xfrm>
+            <a:off x="2758700" y="2526806"/>
+            <a:ext cx="790812" cy="282808"/>
           </a:xfrm>
           <a:prstGeom prst="rect">
             <a:avLst/>
           </a:prstGeom>
-          <a:gradFill flip="none" rotWithShape="1">
-            <a:gsLst>
-              <a:gs pos="0">
-                <a:srgbClr val="BED0CF">
-                  <a:tint val="66000"/>
-                  <a:satMod val="160000"/>
-                </a:srgbClr>
-              </a:gs>
-              <a:gs pos="50000">
-                <a:srgbClr val="BED0CF">
-                  <a:tint val="44500"/>
-                  <a:satMod val="160000"/>
-                </a:srgbClr>
-              </a:gs>
-              <a:gs pos="100000">
-                <a:srgbClr val="BED0CF">
-                  <a:tint val="23500"/>
-                  <a:satMod val="160000"/>
-                </a:srgbClr>
-              </a:gs>
-            </a:gsLst>
-            <a:lin ang="16200000" scaled="1"/>
-            <a:tileRect/>
-          </a:gradFill>
+          <a:solidFill>
+            <a:srgbClr val="559B9B"/>
+          </a:solidFill>
           <a:ln w="19050">
             <a:solidFill>
-              <a:srgbClr val="597B78"/>
+              <a:srgbClr val="559B9B"/>
+            </a:solidFill>
+          </a:ln>
+          <a:effectLst/>
+        </p:spPr>
+        <p:style>
+          <a:lnRef idx="1">
+            <a:schemeClr val="accent4"/>
+          </a:lnRef>
+          <a:fillRef idx="2">
+            <a:schemeClr val="accent4"/>
+          </a:fillRef>
+          <a:effectRef idx="1">
+            <a:schemeClr val="accent4"/>
+          </a:effectRef>
+          <a:fontRef idx="minor">
+            <a:schemeClr val="dk1"/>
+          </a:fontRef>
+        </p:style>
+        <p:txBody>
+          <a:bodyPr rtlCol="0" anchor="ctr"/>
+          <a:lstStyle/>
+          <a:p>
+            <a:pPr algn="ctr"/>
+            <a:r>
+              <a:rPr lang="en-US" sz="1050" dirty="0">
+                <a:solidFill>
+                  <a:schemeClr val="bg1"/>
+                </a:solidFill>
+              </a:rPr>
+              <a:t>Quiz</a:t>
+            </a:r>
+            <a:endParaRPr lang="en-SG" sz="1050" dirty="0">
+              <a:solidFill>
+                <a:schemeClr val="bg1"/>
+              </a:solidFill>
+            </a:endParaRPr>
+          </a:p>
+        </p:txBody>
+      </p:sp>
+      <p:sp>
+        <p:nvSpPr>
+          <p:cNvPr id="92" name="Rectangle 8">
+            <a:extLst>
+              <a:ext uri="{FF2B5EF4-FFF2-40B4-BE49-F238E27FC236}">
+                <a16:creationId xmlns:a16="http://schemas.microsoft.com/office/drawing/2014/main" id="{67E4C022-C312-4F6D-B26E-D9853962427E}"/>
+              </a:ext>
+            </a:extLst>
+          </p:cNvPr>
+          <p:cNvSpPr/>
+          <p:nvPr/>
+        </p:nvSpPr>
+        <p:spPr>
+          <a:xfrm>
+            <a:off x="4041336" y="2524300"/>
+            <a:ext cx="698199" cy="282808"/>
+          </a:xfrm>
+          <a:prstGeom prst="rect">
+            <a:avLst/>
+          </a:prstGeom>
+          <a:solidFill>
+            <a:srgbClr val="559B9B"/>
+          </a:solidFill>
+          <a:ln w="19050">
+            <a:solidFill>
+              <a:srgbClr val="559B9B"/>
+            </a:solidFill>
+          </a:ln>
+          <a:effectLst/>
+        </p:spPr>
+        <p:style>
+          <a:lnRef idx="1">
+            <a:schemeClr val="accent4"/>
+          </a:lnRef>
+          <a:fillRef idx="2">
+            <a:schemeClr val="accent4"/>
+          </a:fillRef>
+          <a:effectRef idx="1">
+            <a:schemeClr val="accent4"/>
+          </a:effectRef>
+          <a:fontRef idx="minor">
+            <a:schemeClr val="dk1"/>
+          </a:fontRef>
+        </p:style>
+        <p:txBody>
+          <a:bodyPr rtlCol="0" anchor="ctr"/>
+          <a:lstStyle/>
+          <a:p>
+            <a:pPr algn="ctr"/>
+            <a:r>
+              <a:rPr lang="en-US" sz="1050" dirty="0" err="1">
+                <a:solidFill>
+                  <a:schemeClr val="bg1"/>
+                </a:solidFill>
+              </a:rPr>
+              <a:t>QuizCard</a:t>
+            </a:r>
+            <a:endParaRPr lang="en-SG" sz="1050" dirty="0">
+              <a:solidFill>
+                <a:schemeClr val="bg1"/>
+              </a:solidFill>
+            </a:endParaRPr>
+          </a:p>
+        </p:txBody>
+      </p:sp>
+      <p:sp>
+        <p:nvSpPr>
+          <p:cNvPr id="93" name="Flowchart: Decision 96">
+            <a:extLst>
+              <a:ext uri="{FF2B5EF4-FFF2-40B4-BE49-F238E27FC236}">
+                <a16:creationId xmlns:a16="http://schemas.microsoft.com/office/drawing/2014/main" id="{43E50658-243C-4789-ABEB-558E442DD94D}"/>
+              </a:ext>
+            </a:extLst>
+          </p:cNvPr>
+          <p:cNvSpPr/>
+          <p:nvPr/>
+        </p:nvSpPr>
+        <p:spPr>
+          <a:xfrm>
+            <a:off x="3567361" y="2560210"/>
+            <a:ext cx="216000" cy="216000"/>
+          </a:xfrm>
+          <a:prstGeom prst="flowChartDecision">
+            <a:avLst/>
+          </a:prstGeom>
+          <a:solidFill>
+            <a:srgbClr val="0E5B5B"/>
+          </a:solidFill>
+          <a:ln w="19050">
+            <a:solidFill>
+              <a:srgbClr val="0E5B5B"/>
+            </a:solidFill>
+          </a:ln>
+          <a:effectLst/>
+        </p:spPr>
+        <p:style>
+          <a:lnRef idx="1">
+            <a:schemeClr val="accent6"/>
+          </a:lnRef>
+          <a:fillRef idx="2">
+            <a:schemeClr val="accent6"/>
+          </a:fillRef>
+          <a:effectRef idx="1">
+            <a:schemeClr val="accent6"/>
+          </a:effectRef>
+          <a:fontRef idx="minor">
+            <a:schemeClr val="dk1"/>
+          </a:fontRef>
+        </p:style>
+        <p:txBody>
+          <a:bodyPr rtlCol="0" anchor="ctr"/>
+          <a:lstStyle/>
+          <a:p>
+            <a:pPr algn="ctr"/>
+            <a:endParaRPr lang="en-US" sz="1050">
+              <a:solidFill>
+                <a:schemeClr val="bg1"/>
+              </a:solidFill>
+            </a:endParaRPr>
+          </a:p>
+        </p:txBody>
+      </p:sp>
+      <p:cxnSp>
+        <p:nvCxnSpPr>
+          <p:cNvPr id="94" name="Elbow Connector 63">
+            <a:extLst>
+              <a:ext uri="{FF2B5EF4-FFF2-40B4-BE49-F238E27FC236}">
+                <a16:creationId xmlns:a16="http://schemas.microsoft.com/office/drawing/2014/main" id="{2CD2439F-3E8C-4A14-AA85-2E812A49ED7F}"/>
+              </a:ext>
+            </a:extLst>
+          </p:cNvPr>
+          <p:cNvCxnSpPr>
+            <a:cxnSpLocks/>
+            <a:stCxn id="93" idx="3"/>
+            <a:endCxn id="92" idx="1"/>
+          </p:cNvCxnSpPr>
+          <p:nvPr/>
+        </p:nvCxnSpPr>
+        <p:spPr>
+          <a:xfrm flipV="1">
+            <a:off x="3783361" y="2665704"/>
+            <a:ext cx="257975" cy="2506"/>
+          </a:xfrm>
+          <a:prstGeom prst="straightConnector1">
+            <a:avLst/>
+          </a:prstGeom>
+          <a:ln w="19050">
+            <a:solidFill>
+              <a:srgbClr val="0E5B5B"/>
+            </a:solidFill>
+            <a:headEnd type="none" w="med" len="med"/>
+            <a:tailEnd type="arrow" w="med" len="med"/>
+          </a:ln>
+          <a:effectLst/>
+        </p:spPr>
+        <p:style>
+          <a:lnRef idx="1">
+            <a:schemeClr val="accent2"/>
+          </a:lnRef>
+          <a:fillRef idx="2">
+            <a:schemeClr val="accent2"/>
+          </a:fillRef>
+          <a:effectRef idx="1">
+            <a:schemeClr val="accent2"/>
+          </a:effectRef>
+          <a:fontRef idx="minor">
+            <a:schemeClr val="dk1"/>
+          </a:fontRef>
+        </p:style>
+      </p:cxnSp>
+      <p:sp>
+        <p:nvSpPr>
+          <p:cNvPr id="95" name="TextBox 94">
+            <a:extLst>
+              <a:ext uri="{FF2B5EF4-FFF2-40B4-BE49-F238E27FC236}">
+                <a16:creationId xmlns:a16="http://schemas.microsoft.com/office/drawing/2014/main" id="{DA6A8630-39C3-4F0D-A02B-626B83ED57FB}"/>
+              </a:ext>
+            </a:extLst>
+          </p:cNvPr>
+          <p:cNvSpPr txBox="1"/>
+          <p:nvPr/>
+        </p:nvSpPr>
+        <p:spPr>
+          <a:xfrm>
+            <a:off x="3794620" y="2713267"/>
+            <a:ext cx="247328" cy="178683"/>
+          </a:xfrm>
+          <a:prstGeom prst="rect">
+            <a:avLst/>
+          </a:prstGeom>
+          <a:noFill/>
+          <a:ln>
+            <a:noFill/>
+          </a:ln>
+        </p:spPr>
+        <p:txBody>
+          <a:bodyPr wrap="square" lIns="0" tIns="0" rIns="0" bIns="0" rtlCol="0">
+            <a:noAutofit/>
+          </a:bodyPr>
+          <a:lstStyle/>
+          <a:p>
+            <a:pPr algn="ctr"/>
+            <a:r>
+              <a:rPr lang="en-US" sz="1100" dirty="0">
+                <a:solidFill>
+                  <a:srgbClr val="0E5B5B"/>
+                </a:solidFill>
+              </a:rPr>
+              <a:t>1..*</a:t>
+            </a:r>
+            <a:endParaRPr lang="en-SG" sz="1100" dirty="0">
+              <a:solidFill>
+                <a:srgbClr val="0E5B5B"/>
+              </a:solidFill>
+            </a:endParaRPr>
+          </a:p>
+        </p:txBody>
+      </p:sp>
+      <p:grpSp>
+        <p:nvGrpSpPr>
+          <p:cNvPr id="96" name="Group 95">
+            <a:extLst>
+              <a:ext uri="{FF2B5EF4-FFF2-40B4-BE49-F238E27FC236}">
+                <a16:creationId xmlns:a16="http://schemas.microsoft.com/office/drawing/2014/main" id="{2FF5D8C8-78FD-4C53-9F15-53DF5F30A09F}"/>
+              </a:ext>
+            </a:extLst>
+          </p:cNvPr>
+          <p:cNvGrpSpPr/>
+          <p:nvPr/>
+        </p:nvGrpSpPr>
+        <p:grpSpPr>
+          <a:xfrm>
+            <a:off x="5293835" y="1711477"/>
+            <a:ext cx="1190625" cy="1098137"/>
+            <a:chOff x="5257800" y="990600"/>
+            <a:chExt cx="1190625" cy="1098137"/>
+          </a:xfrm>
+          <a:solidFill>
+            <a:srgbClr val="559B9B"/>
+          </a:solidFill>
+        </p:grpSpPr>
+        <p:sp>
+          <p:nvSpPr>
+            <p:cNvPr id="98" name="Rectangle 97">
+              <a:extLst>
+                <a:ext uri="{FF2B5EF4-FFF2-40B4-BE49-F238E27FC236}">
+                  <a16:creationId xmlns:a16="http://schemas.microsoft.com/office/drawing/2014/main" id="{AB7612A6-AB37-43CA-8A6E-6B94D273DEC8}"/>
+                </a:ext>
+              </a:extLst>
+            </p:cNvPr>
+            <p:cNvSpPr/>
+            <p:nvPr/>
+          </p:nvSpPr>
+          <p:spPr>
+            <a:xfrm>
+              <a:off x="5257800" y="990600"/>
+              <a:ext cx="1190625" cy="381000"/>
+            </a:xfrm>
+            <a:prstGeom prst="rect">
+              <a:avLst/>
+            </a:prstGeom>
+            <a:grpFill/>
+            <a:ln w="19050">
+              <a:solidFill>
+                <a:srgbClr val="0E5B5B"/>
+              </a:solidFill>
+            </a:ln>
+          </p:spPr>
+          <p:style>
+            <a:lnRef idx="2">
+              <a:schemeClr val="accent1">
+                <a:shade val="50000"/>
+              </a:schemeClr>
+            </a:lnRef>
+            <a:fillRef idx="1">
+              <a:schemeClr val="accent1"/>
+            </a:fillRef>
+            <a:effectRef idx="0">
+              <a:schemeClr val="accent1"/>
+            </a:effectRef>
+            <a:fontRef idx="minor">
+              <a:schemeClr val="lt1"/>
+            </a:fontRef>
+          </p:style>
+          <p:txBody>
+            <a:bodyPr rtlCol="0" anchor="ctr"/>
+            <a:lstStyle/>
+            <a:p>
+              <a:pPr algn="ctr"/>
+              <a:r>
+                <a:rPr lang="en-SG" sz="1050" dirty="0">
+                  <a:solidFill>
+                    <a:schemeClr val="bg1"/>
+                  </a:solidFill>
+                </a:rPr>
+                <a:t>&lt;&lt;enumeration&gt;&gt;</a:t>
+              </a:r>
+              <a:br>
+                <a:rPr lang="en-SG" sz="1050" dirty="0">
+                  <a:solidFill>
+                    <a:schemeClr val="bg1"/>
+                  </a:solidFill>
+                </a:rPr>
+              </a:br>
+              <a:r>
+                <a:rPr lang="en-SG" sz="1050" dirty="0">
+                  <a:solidFill>
+                    <a:schemeClr val="bg1"/>
+                  </a:solidFill>
+                </a:rPr>
+                <a:t>Mode</a:t>
+              </a:r>
+            </a:p>
+          </p:txBody>
+        </p:sp>
+        <p:sp>
+          <p:nvSpPr>
+            <p:cNvPr id="101" name="Rectangle 100">
+              <a:extLst>
+                <a:ext uri="{FF2B5EF4-FFF2-40B4-BE49-F238E27FC236}">
+                  <a16:creationId xmlns:a16="http://schemas.microsoft.com/office/drawing/2014/main" id="{49EE6939-5D7A-496A-8049-A5039D6C7ED8}"/>
+                </a:ext>
+              </a:extLst>
+            </p:cNvPr>
+            <p:cNvSpPr/>
+            <p:nvPr/>
+          </p:nvSpPr>
+          <p:spPr>
+            <a:xfrm>
+              <a:off x="5257800" y="1371600"/>
+              <a:ext cx="1190625" cy="717137"/>
+            </a:xfrm>
+            <a:prstGeom prst="rect">
+              <a:avLst/>
+            </a:prstGeom>
+            <a:grpFill/>
+            <a:ln w="19050">
+              <a:solidFill>
+                <a:srgbClr val="0E5B5B"/>
+              </a:solidFill>
+            </a:ln>
+          </p:spPr>
+          <p:style>
+            <a:lnRef idx="2">
+              <a:schemeClr val="accent1">
+                <a:shade val="50000"/>
+              </a:schemeClr>
+            </a:lnRef>
+            <a:fillRef idx="1">
+              <a:schemeClr val="accent1"/>
+            </a:fillRef>
+            <a:effectRef idx="0">
+              <a:schemeClr val="accent1"/>
+            </a:effectRef>
+            <a:fontRef idx="minor">
+              <a:schemeClr val="lt1"/>
+            </a:fontRef>
+          </p:style>
+          <p:txBody>
+            <a:bodyPr rtlCol="0" anchor="ctr"/>
+            <a:lstStyle/>
+            <a:p>
+              <a:r>
+                <a:rPr lang="en-SG" sz="1050" dirty="0">
+                  <a:solidFill>
+                    <a:schemeClr val="bg1"/>
+                  </a:solidFill>
+                </a:rPr>
+                <a:t>LEARN</a:t>
+              </a:r>
+            </a:p>
+            <a:p>
+              <a:r>
+                <a:rPr lang="en-SG" sz="1050" dirty="0">
+                  <a:solidFill>
+                    <a:schemeClr val="bg1"/>
+                  </a:solidFill>
+                </a:rPr>
+                <a:t>REVIEW</a:t>
+              </a:r>
+            </a:p>
+            <a:p>
+              <a:r>
+                <a:rPr lang="en-SG" sz="1050" dirty="0">
+                  <a:solidFill>
+                    <a:schemeClr val="bg1"/>
+                  </a:solidFill>
+                </a:rPr>
+                <a:t>PREVIEW</a:t>
+              </a:r>
+              <a:br>
+                <a:rPr lang="en-SG" sz="1050" dirty="0">
+                  <a:solidFill>
+                    <a:schemeClr val="bg1"/>
+                  </a:solidFill>
+                </a:rPr>
+              </a:br>
+              <a:r>
+                <a:rPr lang="en-SG" sz="1050" dirty="0">
+                  <a:solidFill>
+                    <a:schemeClr val="bg1"/>
+                  </a:solidFill>
+                </a:rPr>
+                <a:t>DIFFICULT</a:t>
+              </a:r>
+            </a:p>
+          </p:txBody>
+        </p:sp>
+      </p:grpSp>
+      <p:sp>
+        <p:nvSpPr>
+          <p:cNvPr id="9" name="Rectangle 62"/>
+          <p:cNvSpPr/>
+          <p:nvPr/>
+        </p:nvSpPr>
+        <p:spPr>
+          <a:xfrm>
+            <a:off x="750659" y="2497197"/>
+            <a:ext cx="1382166" cy="345600"/>
+          </a:xfrm>
+          <a:prstGeom prst="rect">
+            <a:avLst/>
+          </a:prstGeom>
+          <a:solidFill>
+            <a:srgbClr val="0E5B5B"/>
+          </a:solidFill>
+          <a:ln w="19050">
+            <a:solidFill>
+              <a:srgbClr val="0E5B5B"/>
             </a:solidFill>
           </a:ln>
           <a:effectLst/>
@@ -3567,105 +4123,14 @@
             <a:r>
               <a:rPr lang="en-US" sz="1050" dirty="0" err="1">
                 <a:solidFill>
-                  <a:srgbClr val="597B78"/>
+                  <a:schemeClr val="bg1"/>
                 </a:solidFill>
               </a:rPr>
               <a:t>QuizModelManager</a:t>
             </a:r>
             <a:endParaRPr lang="en-SG" sz="1050" dirty="0">
               <a:solidFill>
-                <a:srgbClr val="597B78"/>
-              </a:solidFill>
-            </a:endParaRPr>
-          </a:p>
-        </p:txBody>
-      </p:sp>
-      <p:sp>
-        <p:nvSpPr>
-          <p:cNvPr id="119" name="Rectangle 62"/>
-          <p:cNvSpPr/>
-          <p:nvPr/>
-        </p:nvSpPr>
-        <p:spPr>
-          <a:xfrm rot="16200000">
-            <a:off x="1870603" y="3056328"/>
-            <a:ext cx="1093635" cy="346760"/>
-          </a:xfrm>
-          <a:prstGeom prst="rect">
-            <a:avLst/>
-          </a:prstGeom>
-          <a:gradFill flip="none" rotWithShape="1">
-            <a:gsLst>
-              <a:gs pos="0">
-                <a:srgbClr val="BED0CF">
-                  <a:tint val="66000"/>
-                  <a:satMod val="160000"/>
-                </a:srgbClr>
-              </a:gs>
-              <a:gs pos="50000">
-                <a:srgbClr val="BED0CF">
-                  <a:tint val="44500"/>
-                  <a:satMod val="160000"/>
-                </a:srgbClr>
-              </a:gs>
-              <a:gs pos="100000">
-                <a:srgbClr val="BED0CF">
-                  <a:tint val="23500"/>
-                  <a:satMod val="160000"/>
-                </a:srgbClr>
-              </a:gs>
-            </a:gsLst>
-            <a:lin ang="16200000" scaled="1"/>
-            <a:tileRect/>
-          </a:gradFill>
-          <a:ln w="19050">
-            <a:solidFill>
-              <a:srgbClr val="597B78"/>
-            </a:solidFill>
-          </a:ln>
-          <a:effectLst/>
-        </p:spPr>
-        <p:style>
-          <a:lnRef idx="1">
-            <a:schemeClr val="accent2"/>
-          </a:lnRef>
-          <a:fillRef idx="2">
-            <a:schemeClr val="accent2"/>
-          </a:fillRef>
-          <a:effectRef idx="1">
-            <a:schemeClr val="accent2"/>
-          </a:effectRef>
-          <a:fontRef idx="minor">
-            <a:schemeClr val="dk1"/>
-          </a:fontRef>
-        </p:style>
-        <p:txBody>
-          <a:bodyPr rtlCol="0" anchor="ctr"/>
-          <a:lstStyle/>
-          <a:p>
-            <a:pPr algn="ctr"/>
-            <a:r>
-              <a:rPr lang="en-US" sz="1050" dirty="0">
-                <a:solidFill>
-                  <a:srgbClr val="597B78"/>
-                </a:solidFill>
-              </a:rPr>
-              <a:t>&lt;&lt;interface&gt;&gt;</a:t>
-            </a:r>
-          </a:p>
-          <a:p>
-            <a:pPr algn="ctr"/>
-            <a:r>
-              <a:rPr lang="en-US" sz="1050" dirty="0" err="1">
-                <a:solidFill>
-                  <a:srgbClr val="597B78"/>
-                </a:solidFill>
-              </a:rPr>
-              <a:t>QuizModel</a:t>
-            </a:r>
-            <a:endParaRPr lang="en-SG" sz="1050" dirty="0">
-              <a:solidFill>
-                <a:srgbClr val="597B78"/>
+                <a:schemeClr val="bg1"/>
               </a:solidFill>
             </a:endParaRPr>
           </a:p>
@@ -3678,19 +4143,19 @@
           <p:nvPr/>
         </p:nvSpPr>
         <p:spPr>
-          <a:xfrm rot="16200000">
-            <a:off x="2558096" y="3147417"/>
+          <a:xfrm>
+            <a:off x="1304105" y="2116162"/>
             <a:ext cx="270504" cy="175523"/>
           </a:xfrm>
           <a:prstGeom prst="triangle">
             <a:avLst/>
           </a:prstGeom>
           <a:solidFill>
-            <a:srgbClr val="597B78"/>
+            <a:srgbClr val="0E5B5B"/>
           </a:solidFill>
           <a:ln w="19050">
             <a:solidFill>
-              <a:srgbClr val="597B78"/>
+              <a:srgbClr val="0E5B5B"/>
             </a:solidFill>
           </a:ln>
           <a:effectLst/>
@@ -3724,13 +4189,443 @@
       </p:sp>
       <p:cxnSp>
         <p:nvCxnSpPr>
-          <p:cNvPr id="75" name="Elbow Connector 122"/>
-          <p:cNvCxnSpPr/>
+          <p:cNvPr id="21" name="Straight Connector 20"/>
+          <p:cNvCxnSpPr>
+            <a:cxnSpLocks/>
+            <a:stCxn id="120" idx="3"/>
+            <a:endCxn id="9" idx="0"/>
+          </p:cNvCxnSpPr>
           <p:nvPr/>
         </p:nvCxnSpPr>
         <p:spPr>
           <a:xfrm>
-            <a:off x="1052294" y="3229707"/>
+            <a:off x="1439357" y="2291685"/>
+            <a:ext cx="2385" cy="205512"/>
+          </a:xfrm>
+          <a:prstGeom prst="line">
+            <a:avLst/>
+          </a:prstGeom>
+          <a:ln w="19050">
+            <a:solidFill>
+              <a:srgbClr val="0E5B5B"/>
+            </a:solidFill>
+            <a:prstDash val="sysDot"/>
+            <a:headEnd type="none" w="med" len="med"/>
+            <a:tailEnd type="none" w="med" len="med"/>
+          </a:ln>
+          <a:effectLst/>
+        </p:spPr>
+        <p:style>
+          <a:lnRef idx="1">
+            <a:schemeClr val="accent2"/>
+          </a:lnRef>
+          <a:fillRef idx="2">
+            <a:schemeClr val="accent2"/>
+          </a:fillRef>
+          <a:effectRef idx="1">
+            <a:schemeClr val="accent2"/>
+          </a:effectRef>
+          <a:fontRef idx="minor">
+            <a:schemeClr val="dk1"/>
+          </a:fontRef>
+        </p:style>
+      </p:cxnSp>
+      <p:cxnSp>
+        <p:nvCxnSpPr>
+          <p:cNvPr id="24" name="Straight Arrow Connector 23">
+            <a:extLst>
+              <a:ext uri="{FF2B5EF4-FFF2-40B4-BE49-F238E27FC236}">
+                <a16:creationId xmlns:a16="http://schemas.microsoft.com/office/drawing/2014/main" id="{9B7A24CB-45B0-41E9-9D6C-5813DF4A64D7}"/>
+              </a:ext>
+            </a:extLst>
+          </p:cNvPr>
+          <p:cNvCxnSpPr>
+            <a:cxnSpLocks/>
+            <a:endCxn id="27" idx="1"/>
+          </p:cNvCxnSpPr>
+          <p:nvPr/>
+        </p:nvCxnSpPr>
+        <p:spPr>
+          <a:xfrm flipV="1">
+            <a:off x="2530861" y="2064111"/>
+            <a:ext cx="233298" cy="1428"/>
+          </a:xfrm>
+          <a:prstGeom prst="straightConnector1">
+            <a:avLst/>
+          </a:prstGeom>
+          <a:ln w="19050">
+            <a:solidFill>
+              <a:srgbClr val="0E5B5B"/>
+            </a:solidFill>
+            <a:headEnd type="none" w="med" len="med"/>
+            <a:tailEnd type="arrow" w="med" len="med"/>
+          </a:ln>
+          <a:effectLst/>
+        </p:spPr>
+        <p:style>
+          <a:lnRef idx="1">
+            <a:schemeClr val="accent2"/>
+          </a:lnRef>
+          <a:fillRef idx="2">
+            <a:schemeClr val="accent2"/>
+          </a:fillRef>
+          <a:effectRef idx="1">
+            <a:schemeClr val="accent2"/>
+          </a:effectRef>
+          <a:fontRef idx="minor">
+            <a:schemeClr val="dk1"/>
+          </a:fontRef>
+        </p:style>
+      </p:cxnSp>
+      <p:sp>
+        <p:nvSpPr>
+          <p:cNvPr id="26" name="TextBox 25">
+            <a:extLst>
+              <a:ext uri="{FF2B5EF4-FFF2-40B4-BE49-F238E27FC236}">
+                <a16:creationId xmlns:a16="http://schemas.microsoft.com/office/drawing/2014/main" id="{CDD27E4B-3E21-4BC7-8CB5-CD4E2FBA118E}"/>
+              </a:ext>
+            </a:extLst>
+          </p:cNvPr>
+          <p:cNvSpPr txBox="1"/>
+          <p:nvPr/>
+        </p:nvSpPr>
+        <p:spPr>
+          <a:xfrm>
+            <a:off x="2585744" y="2114235"/>
+            <a:ext cx="189257" cy="178683"/>
+          </a:xfrm>
+          <a:prstGeom prst="rect">
+            <a:avLst/>
+          </a:prstGeom>
+          <a:noFill/>
+          <a:ln>
+            <a:noFill/>
+          </a:ln>
+        </p:spPr>
+        <p:txBody>
+          <a:bodyPr wrap="square" lIns="0" tIns="0" rIns="0" bIns="0" rtlCol="0">
+            <a:noAutofit/>
+          </a:bodyPr>
+          <a:lstStyle/>
+          <a:p>
+            <a:pPr algn="ctr"/>
+            <a:r>
+              <a:rPr lang="en-US" sz="1100" dirty="0">
+                <a:solidFill>
+                  <a:srgbClr val="0E5B5B"/>
+                </a:solidFill>
+              </a:rPr>
+              <a:t>1</a:t>
+            </a:r>
+            <a:endParaRPr lang="en-SG" sz="1100" dirty="0">
+              <a:solidFill>
+                <a:srgbClr val="0E5B5B"/>
+              </a:solidFill>
+            </a:endParaRPr>
+          </a:p>
+        </p:txBody>
+      </p:sp>
+      <p:sp>
+        <p:nvSpPr>
+          <p:cNvPr id="27" name="Rectangle 8">
+            <a:extLst>
+              <a:ext uri="{FF2B5EF4-FFF2-40B4-BE49-F238E27FC236}">
+                <a16:creationId xmlns:a16="http://schemas.microsoft.com/office/drawing/2014/main" id="{D6832160-4177-4296-A5D2-39FE94C63F5E}"/>
+              </a:ext>
+            </a:extLst>
+          </p:cNvPr>
+          <p:cNvSpPr/>
+          <p:nvPr/>
+        </p:nvSpPr>
+        <p:spPr>
+          <a:xfrm>
+            <a:off x="2764159" y="1922707"/>
+            <a:ext cx="790812" cy="282808"/>
+          </a:xfrm>
+          <a:prstGeom prst="rect">
+            <a:avLst/>
+          </a:prstGeom>
+          <a:solidFill>
+            <a:srgbClr val="559B9B"/>
+          </a:solidFill>
+          <a:ln w="19050">
+            <a:solidFill>
+              <a:srgbClr val="559B9B"/>
+            </a:solidFill>
+          </a:ln>
+          <a:effectLst/>
+        </p:spPr>
+        <p:style>
+          <a:lnRef idx="1">
+            <a:schemeClr val="accent4"/>
+          </a:lnRef>
+          <a:fillRef idx="2">
+            <a:schemeClr val="accent4"/>
+          </a:fillRef>
+          <a:effectRef idx="1">
+            <a:schemeClr val="accent4"/>
+          </a:effectRef>
+          <a:fontRef idx="minor">
+            <a:schemeClr val="dk1"/>
+          </a:fontRef>
+        </p:style>
+        <p:txBody>
+          <a:bodyPr rtlCol="0" anchor="ctr"/>
+          <a:lstStyle/>
+          <a:p>
+            <a:pPr algn="ctr"/>
+            <a:r>
+              <a:rPr lang="en-US" sz="1050" dirty="0">
+                <a:solidFill>
+                  <a:schemeClr val="bg1"/>
+                </a:solidFill>
+              </a:rPr>
+              <a:t>Session</a:t>
+            </a:r>
+            <a:endParaRPr lang="en-SG" sz="1050" dirty="0">
+              <a:solidFill>
+                <a:schemeClr val="bg1"/>
+              </a:solidFill>
+            </a:endParaRPr>
+          </a:p>
+        </p:txBody>
+      </p:sp>
+      <p:sp>
+        <p:nvSpPr>
+          <p:cNvPr id="28" name="Rectangle 8">
+            <a:extLst>
+              <a:ext uri="{FF2B5EF4-FFF2-40B4-BE49-F238E27FC236}">
+                <a16:creationId xmlns:a16="http://schemas.microsoft.com/office/drawing/2014/main" id="{18D896D9-6754-4AC7-9A42-834C9292B3BA}"/>
+              </a:ext>
+            </a:extLst>
+          </p:cNvPr>
+          <p:cNvSpPr/>
+          <p:nvPr/>
+        </p:nvSpPr>
+        <p:spPr>
+          <a:xfrm>
+            <a:off x="4041948" y="1920739"/>
+            <a:ext cx="698200" cy="282808"/>
+          </a:xfrm>
+          <a:prstGeom prst="rect">
+            <a:avLst/>
+          </a:prstGeom>
+          <a:solidFill>
+            <a:srgbClr val="559B9B"/>
+          </a:solidFill>
+          <a:ln w="19050">
+            <a:solidFill>
+              <a:srgbClr val="559B9B"/>
+            </a:solidFill>
+          </a:ln>
+          <a:effectLst/>
+        </p:spPr>
+        <p:style>
+          <a:lnRef idx="1">
+            <a:schemeClr val="accent4"/>
+          </a:lnRef>
+          <a:fillRef idx="2">
+            <a:schemeClr val="accent4"/>
+          </a:fillRef>
+          <a:effectRef idx="1">
+            <a:schemeClr val="accent4"/>
+          </a:effectRef>
+          <a:fontRef idx="minor">
+            <a:schemeClr val="dk1"/>
+          </a:fontRef>
+        </p:style>
+        <p:txBody>
+          <a:bodyPr rtlCol="0" anchor="ctr"/>
+          <a:lstStyle/>
+          <a:p>
+            <a:pPr algn="ctr"/>
+            <a:r>
+              <a:rPr lang="en-US" sz="1050" dirty="0" err="1">
+                <a:solidFill>
+                  <a:schemeClr val="bg1"/>
+                </a:solidFill>
+              </a:rPr>
+              <a:t>SrsCard</a:t>
+            </a:r>
+            <a:endParaRPr lang="en-SG" sz="1050" dirty="0">
+              <a:solidFill>
+                <a:schemeClr val="bg1"/>
+              </a:solidFill>
+            </a:endParaRPr>
+          </a:p>
+        </p:txBody>
+      </p:sp>
+      <p:sp>
+        <p:nvSpPr>
+          <p:cNvPr id="29" name="Flowchart: Decision 96">
+            <a:extLst>
+              <a:ext uri="{FF2B5EF4-FFF2-40B4-BE49-F238E27FC236}">
+                <a16:creationId xmlns:a16="http://schemas.microsoft.com/office/drawing/2014/main" id="{4C017955-09FB-4077-BE16-EF592F9E48E6}"/>
+              </a:ext>
+            </a:extLst>
+          </p:cNvPr>
+          <p:cNvSpPr/>
+          <p:nvPr/>
+        </p:nvSpPr>
+        <p:spPr>
+          <a:xfrm>
+            <a:off x="3574324" y="1956111"/>
+            <a:ext cx="209650" cy="216000"/>
+          </a:xfrm>
+          <a:prstGeom prst="flowChartDecision">
+            <a:avLst/>
+          </a:prstGeom>
+          <a:solidFill>
+            <a:srgbClr val="0E5B5B"/>
+          </a:solidFill>
+          <a:ln w="19050">
+            <a:solidFill>
+              <a:srgbClr val="0E5B5B"/>
+            </a:solidFill>
+          </a:ln>
+          <a:effectLst/>
+        </p:spPr>
+        <p:style>
+          <a:lnRef idx="1">
+            <a:schemeClr val="accent6"/>
+          </a:lnRef>
+          <a:fillRef idx="2">
+            <a:schemeClr val="accent6"/>
+          </a:fillRef>
+          <a:effectRef idx="1">
+            <a:schemeClr val="accent6"/>
+          </a:effectRef>
+          <a:fontRef idx="minor">
+            <a:schemeClr val="dk1"/>
+          </a:fontRef>
+        </p:style>
+        <p:txBody>
+          <a:bodyPr rtlCol="0" anchor="ctr"/>
+          <a:lstStyle/>
+          <a:p>
+            <a:pPr algn="ctr"/>
+            <a:endParaRPr lang="en-US" sz="1050">
+              <a:solidFill>
+                <a:schemeClr val="bg1"/>
+              </a:solidFill>
+            </a:endParaRPr>
+          </a:p>
+        </p:txBody>
+      </p:sp>
+      <p:cxnSp>
+        <p:nvCxnSpPr>
+          <p:cNvPr id="30" name="Elbow Connector 63">
+            <a:extLst>
+              <a:ext uri="{FF2B5EF4-FFF2-40B4-BE49-F238E27FC236}">
+                <a16:creationId xmlns:a16="http://schemas.microsoft.com/office/drawing/2014/main" id="{FE181668-9144-4468-ABB0-D1B3CA9FB5B2}"/>
+              </a:ext>
+            </a:extLst>
+          </p:cNvPr>
+          <p:cNvCxnSpPr>
+            <a:cxnSpLocks/>
+            <a:stCxn id="29" idx="3"/>
+            <a:endCxn id="28" idx="1"/>
+          </p:cNvCxnSpPr>
+          <p:nvPr/>
+        </p:nvCxnSpPr>
+        <p:spPr>
+          <a:xfrm flipV="1">
+            <a:off x="3783974" y="2062143"/>
+            <a:ext cx="257974" cy="1968"/>
+          </a:xfrm>
+          <a:prstGeom prst="straightConnector1">
+            <a:avLst/>
+          </a:prstGeom>
+          <a:ln w="19050">
+            <a:solidFill>
+              <a:srgbClr val="0E5B5B"/>
+            </a:solidFill>
+            <a:headEnd type="none" w="med" len="med"/>
+            <a:tailEnd type="arrow" w="med" len="med"/>
+          </a:ln>
+          <a:effectLst/>
+        </p:spPr>
+        <p:style>
+          <a:lnRef idx="1">
+            <a:schemeClr val="accent2"/>
+          </a:lnRef>
+          <a:fillRef idx="2">
+            <a:schemeClr val="accent2"/>
+          </a:fillRef>
+          <a:effectRef idx="1">
+            <a:schemeClr val="accent2"/>
+          </a:effectRef>
+          <a:fontRef idx="minor">
+            <a:schemeClr val="dk1"/>
+          </a:fontRef>
+        </p:style>
+      </p:cxnSp>
+      <p:sp>
+        <p:nvSpPr>
+          <p:cNvPr id="31" name="TextBox 30">
+            <a:extLst>
+              <a:ext uri="{FF2B5EF4-FFF2-40B4-BE49-F238E27FC236}">
+                <a16:creationId xmlns:a16="http://schemas.microsoft.com/office/drawing/2014/main" id="{074B6BD6-1D7D-4641-936E-427FC1C157A5}"/>
+              </a:ext>
+            </a:extLst>
+          </p:cNvPr>
+          <p:cNvSpPr txBox="1"/>
+          <p:nvPr/>
+        </p:nvSpPr>
+        <p:spPr>
+          <a:xfrm>
+            <a:off x="3750311" y="2130896"/>
+            <a:ext cx="292249" cy="178683"/>
+          </a:xfrm>
+          <a:prstGeom prst="rect">
+            <a:avLst/>
+          </a:prstGeom>
+          <a:noFill/>
+          <a:ln>
+            <a:noFill/>
+          </a:ln>
+        </p:spPr>
+        <p:txBody>
+          <a:bodyPr wrap="square" lIns="0" tIns="0" rIns="0" bIns="0" rtlCol="0">
+            <a:noAutofit/>
+          </a:bodyPr>
+          <a:lstStyle/>
+          <a:p>
+            <a:pPr algn="ctr"/>
+            <a:r>
+              <a:rPr lang="en-US" sz="1100" dirty="0">
+                <a:solidFill>
+                  <a:srgbClr val="0E5B5B"/>
+                </a:solidFill>
+              </a:rPr>
+              <a:t>1..*</a:t>
+            </a:r>
+            <a:endParaRPr lang="en-SG" sz="1100" dirty="0">
+              <a:solidFill>
+                <a:srgbClr val="0E5B5B"/>
+              </a:solidFill>
+            </a:endParaRPr>
+          </a:p>
+        </p:txBody>
+      </p:sp>
+      <p:cxnSp>
+        <p:nvCxnSpPr>
+          <p:cNvPr id="44" name="Elbow Connector 122">
+            <a:extLst>
+              <a:ext uri="{FF2B5EF4-FFF2-40B4-BE49-F238E27FC236}">
+                <a16:creationId xmlns:a16="http://schemas.microsoft.com/office/drawing/2014/main" id="{2EC63785-16CD-4A55-82C2-5D01E6DE100F}"/>
+              </a:ext>
+            </a:extLst>
+          </p:cNvPr>
+          <p:cNvCxnSpPr>
+            <a:cxnSpLocks/>
+            <a:endCxn id="45" idx="1"/>
+          </p:cNvCxnSpPr>
+          <p:nvPr/>
+        </p:nvCxnSpPr>
+        <p:spPr>
+          <a:xfrm>
+            <a:off x="326342" y="1132607"/>
             <a:ext cx="419548" cy="2860"/>
           </a:xfrm>
           <a:prstGeom prst="bentConnector3">
@@ -3765,31 +4660,33 @@
           </a:fontRef>
         </p:style>
       </p:cxnSp>
-      <p:cxnSp>
-        <p:nvCxnSpPr>
-          <p:cNvPr id="21" name="Straight Connector 20"/>
-          <p:cNvCxnSpPr>
-            <a:cxnSpLocks/>
-            <a:stCxn id="120" idx="3"/>
-            <a:endCxn id="9" idx="0"/>
-          </p:cNvCxnSpPr>
+      <p:sp>
+        <p:nvSpPr>
+          <p:cNvPr id="45" name="Rectangle 62">
+            <a:extLst>
+              <a:ext uri="{FF2B5EF4-FFF2-40B4-BE49-F238E27FC236}">
+                <a16:creationId xmlns:a16="http://schemas.microsoft.com/office/drawing/2014/main" id="{E0AF326B-8601-41F4-A537-E78C2BEE13F7}"/>
+              </a:ext>
+            </a:extLst>
+          </p:cNvPr>
+          <p:cNvSpPr/>
           <p:nvPr/>
-        </p:nvCxnSpPr>
+        </p:nvSpPr>
         <p:spPr>
           <a:xfrm>
-            <a:off x="2781110" y="3235179"/>
-            <a:ext cx="207475" cy="3320"/>
+            <a:off x="745890" y="962087"/>
+            <a:ext cx="1386935" cy="346760"/>
           </a:xfrm>
-          <a:prstGeom prst="line">
+          <a:prstGeom prst="rect">
             <a:avLst/>
           </a:prstGeom>
+          <a:solidFill>
+            <a:schemeClr val="bg1">
+              <a:lumMod val="50000"/>
+            </a:schemeClr>
+          </a:solidFill>
           <a:ln w="19050">
-            <a:solidFill>
-              <a:srgbClr val="597B78"/>
-            </a:solidFill>
-            <a:prstDash val="sysDot"/>
-            <a:headEnd type="none" w="med" len="med"/>
-            <a:tailEnd type="none" w="med" len="med"/>
+            <a:noFill/>
           </a:ln>
           <a:effectLst/>
         </p:spPr>
@@ -3807,486 +4704,44 @@
             <a:schemeClr val="dk1"/>
           </a:fontRef>
         </p:style>
-      </p:cxnSp>
-      <p:cxnSp>
-        <p:nvCxnSpPr>
-          <p:cNvPr id="88" name="Straight Arrow Connector 87">
+        <p:txBody>
+          <a:bodyPr rtlCol="0" anchor="ctr"/>
+          <a:lstStyle/>
+          <a:p>
+            <a:pPr algn="ctr"/>
+            <a:r>
+              <a:rPr lang="en-US" sz="1050" dirty="0">
+                <a:solidFill>
+                  <a:schemeClr val="bg1"/>
+                </a:solidFill>
+              </a:rPr>
+              <a:t>&lt;&lt;interface&gt;&gt;</a:t>
+            </a:r>
+          </a:p>
+          <a:p>
+            <a:pPr algn="ctr"/>
+            <a:r>
+              <a:rPr lang="en-US" sz="1050" dirty="0">
+                <a:solidFill>
+                  <a:schemeClr val="bg1"/>
+                </a:solidFill>
+              </a:rPr>
+              <a:t>Model</a:t>
+            </a:r>
+            <a:endParaRPr lang="en-SG" sz="1050" dirty="0">
+              <a:solidFill>
+                <a:schemeClr val="bg1"/>
+              </a:solidFill>
+            </a:endParaRPr>
+          </a:p>
+        </p:txBody>
+      </p:sp>
+      <p:grpSp>
+        <p:nvGrpSpPr>
+          <p:cNvPr id="46" name="Group 45">
             <a:extLst>
               <a:ext uri="{FF2B5EF4-FFF2-40B4-BE49-F238E27FC236}">
-                <a16:creationId xmlns:a16="http://schemas.microsoft.com/office/drawing/2014/main" id="{C249130F-C4E5-4BF6-AD3B-372EDF6BE0CC}"/>
-              </a:ext>
-            </a:extLst>
-          </p:cNvPr>
-          <p:cNvCxnSpPr>
-            <a:cxnSpLocks/>
-            <a:stCxn id="89" idx="3"/>
-            <a:endCxn id="91" idx="1"/>
-          </p:cNvCxnSpPr>
-          <p:nvPr/>
-        </p:nvCxnSpPr>
-        <p:spPr>
-          <a:xfrm flipV="1">
-            <a:off x="3561321" y="2764930"/>
-            <a:ext cx="233298" cy="1428"/>
-          </a:xfrm>
-          <a:prstGeom prst="straightConnector1">
-            <a:avLst/>
-          </a:prstGeom>
-          <a:ln w="19050">
-            <a:solidFill>
-              <a:srgbClr val="597B78"/>
-            </a:solidFill>
-            <a:headEnd type="none" w="med" len="med"/>
-            <a:tailEnd type="arrow" w="med" len="med"/>
-          </a:ln>
-          <a:effectLst/>
-        </p:spPr>
-        <p:style>
-          <a:lnRef idx="1">
-            <a:schemeClr val="accent2"/>
-          </a:lnRef>
-          <a:fillRef idx="2">
-            <a:schemeClr val="accent2"/>
-          </a:fillRef>
-          <a:effectRef idx="1">
-            <a:schemeClr val="accent2"/>
-          </a:effectRef>
-          <a:fontRef idx="minor">
-            <a:schemeClr val="dk1"/>
-          </a:fontRef>
-        </p:style>
-      </p:cxnSp>
-      <p:sp>
-        <p:nvSpPr>
-          <p:cNvPr id="89" name="Flowchart: Decision 96">
-            <a:extLst>
-              <a:ext uri="{FF2B5EF4-FFF2-40B4-BE49-F238E27FC236}">
-                <a16:creationId xmlns:a16="http://schemas.microsoft.com/office/drawing/2014/main" id="{958FB765-0710-45ED-A7DF-8420977E1407}"/>
-              </a:ext>
-            </a:extLst>
-          </p:cNvPr>
-          <p:cNvSpPr/>
-          <p:nvPr/>
-        </p:nvSpPr>
-        <p:spPr>
-          <a:xfrm>
-            <a:off x="3345321" y="2658358"/>
-            <a:ext cx="216000" cy="216000"/>
-          </a:xfrm>
-          <a:prstGeom prst="flowChartDecision">
-            <a:avLst/>
-          </a:prstGeom>
-          <a:noFill/>
-          <a:ln w="19050">
-            <a:solidFill>
-              <a:srgbClr val="597B78"/>
-            </a:solidFill>
-          </a:ln>
-          <a:effectLst/>
-        </p:spPr>
-        <p:style>
-          <a:lnRef idx="1">
-            <a:schemeClr val="accent6"/>
-          </a:lnRef>
-          <a:fillRef idx="2">
-            <a:schemeClr val="accent6"/>
-          </a:fillRef>
-          <a:effectRef idx="1">
-            <a:schemeClr val="accent6"/>
-          </a:effectRef>
-          <a:fontRef idx="minor">
-            <a:schemeClr val="dk1"/>
-          </a:fontRef>
-        </p:style>
-        <p:txBody>
-          <a:bodyPr rtlCol="0" anchor="ctr"/>
-          <a:lstStyle/>
-          <a:p>
-            <a:pPr algn="ctr"/>
-            <a:endParaRPr lang="en-US" sz="1050">
-              <a:solidFill>
-                <a:srgbClr val="597B78"/>
-              </a:solidFill>
-            </a:endParaRPr>
-          </a:p>
-        </p:txBody>
-      </p:sp>
-      <p:sp>
-        <p:nvSpPr>
-          <p:cNvPr id="90" name="TextBox 89">
-            <a:extLst>
-              <a:ext uri="{FF2B5EF4-FFF2-40B4-BE49-F238E27FC236}">
-                <a16:creationId xmlns:a16="http://schemas.microsoft.com/office/drawing/2014/main" id="{D4707CAA-9DEA-47E2-892B-F77BA2C5110E}"/>
-              </a:ext>
-            </a:extLst>
-          </p:cNvPr>
-          <p:cNvSpPr txBox="1"/>
-          <p:nvPr/>
-        </p:nvSpPr>
-        <p:spPr>
-          <a:xfrm>
-            <a:off x="3616204" y="2815054"/>
-            <a:ext cx="189257" cy="178683"/>
-          </a:xfrm>
-          <a:prstGeom prst="rect">
-            <a:avLst/>
-          </a:prstGeom>
-          <a:noFill/>
-        </p:spPr>
-        <p:txBody>
-          <a:bodyPr wrap="square" lIns="0" tIns="0" rIns="0" bIns="0" rtlCol="0">
-            <a:noAutofit/>
-          </a:bodyPr>
-          <a:lstStyle/>
-          <a:p>
-            <a:pPr algn="ctr"/>
-            <a:r>
-              <a:rPr lang="en-US" sz="1100" dirty="0">
-                <a:solidFill>
-                  <a:srgbClr val="597B78"/>
-                </a:solidFill>
-              </a:rPr>
-              <a:t>1</a:t>
-            </a:r>
-            <a:endParaRPr lang="en-SG" sz="1100" dirty="0">
-              <a:solidFill>
-                <a:srgbClr val="597B78"/>
-              </a:solidFill>
-            </a:endParaRPr>
-          </a:p>
-        </p:txBody>
-      </p:sp>
-      <p:sp>
-        <p:nvSpPr>
-          <p:cNvPr id="91" name="Rectangle 8">
-            <a:extLst>
-              <a:ext uri="{FF2B5EF4-FFF2-40B4-BE49-F238E27FC236}">
-                <a16:creationId xmlns:a16="http://schemas.microsoft.com/office/drawing/2014/main" id="{647B1DA6-44B2-469D-8297-C18F1D4BBDFD}"/>
-              </a:ext>
-            </a:extLst>
-          </p:cNvPr>
-          <p:cNvSpPr/>
-          <p:nvPr/>
-        </p:nvSpPr>
-        <p:spPr>
-          <a:xfrm>
-            <a:off x="3794619" y="2623526"/>
-            <a:ext cx="790812" cy="282808"/>
-          </a:xfrm>
-          <a:prstGeom prst="rect">
-            <a:avLst/>
-          </a:prstGeom>
-          <a:gradFill flip="none" rotWithShape="1">
-            <a:gsLst>
-              <a:gs pos="0">
-                <a:srgbClr val="BED0CF">
-                  <a:tint val="66000"/>
-                  <a:satMod val="160000"/>
-                </a:srgbClr>
-              </a:gs>
-              <a:gs pos="50000">
-                <a:srgbClr val="BED0CF">
-                  <a:tint val="44500"/>
-                  <a:satMod val="160000"/>
-                </a:srgbClr>
-              </a:gs>
-              <a:gs pos="100000">
-                <a:srgbClr val="BED0CF">
-                  <a:tint val="23500"/>
-                  <a:satMod val="160000"/>
-                </a:srgbClr>
-              </a:gs>
-            </a:gsLst>
-            <a:lin ang="16200000" scaled="1"/>
-            <a:tileRect/>
-          </a:gradFill>
-          <a:ln w="19050">
-            <a:solidFill>
-              <a:srgbClr val="597B78"/>
-            </a:solidFill>
-          </a:ln>
-          <a:effectLst/>
-        </p:spPr>
-        <p:style>
-          <a:lnRef idx="1">
-            <a:schemeClr val="accent4"/>
-          </a:lnRef>
-          <a:fillRef idx="2">
-            <a:schemeClr val="accent4"/>
-          </a:fillRef>
-          <a:effectRef idx="1">
-            <a:schemeClr val="accent4"/>
-          </a:effectRef>
-          <a:fontRef idx="minor">
-            <a:schemeClr val="dk1"/>
-          </a:fontRef>
-        </p:style>
-        <p:txBody>
-          <a:bodyPr rtlCol="0" anchor="ctr"/>
-          <a:lstStyle/>
-          <a:p>
-            <a:pPr algn="ctr"/>
-            <a:r>
-              <a:rPr lang="en-US" sz="1050" dirty="0">
-                <a:solidFill>
-                  <a:srgbClr val="597B78"/>
-                </a:solidFill>
-              </a:rPr>
-              <a:t>Quiz</a:t>
-            </a:r>
-            <a:endParaRPr lang="en-SG" sz="1050" dirty="0">
-              <a:solidFill>
-                <a:srgbClr val="597B78"/>
-              </a:solidFill>
-            </a:endParaRPr>
-          </a:p>
-        </p:txBody>
-      </p:sp>
-      <p:sp>
-        <p:nvSpPr>
-          <p:cNvPr id="92" name="Rectangle 8">
-            <a:extLst>
-              <a:ext uri="{FF2B5EF4-FFF2-40B4-BE49-F238E27FC236}">
-                <a16:creationId xmlns:a16="http://schemas.microsoft.com/office/drawing/2014/main" id="{67E4C022-C312-4F6D-B26E-D9853962427E}"/>
-              </a:ext>
-            </a:extLst>
-          </p:cNvPr>
-          <p:cNvSpPr/>
-          <p:nvPr/>
-        </p:nvSpPr>
-        <p:spPr>
-          <a:xfrm>
-            <a:off x="5065446" y="2621020"/>
-            <a:ext cx="698199" cy="282808"/>
-          </a:xfrm>
-          <a:prstGeom prst="rect">
-            <a:avLst/>
-          </a:prstGeom>
-          <a:gradFill flip="none" rotWithShape="1">
-            <a:gsLst>
-              <a:gs pos="0">
-                <a:srgbClr val="BED0CF">
-                  <a:tint val="66000"/>
-                  <a:satMod val="160000"/>
-                </a:srgbClr>
-              </a:gs>
-              <a:gs pos="50000">
-                <a:srgbClr val="BED0CF">
-                  <a:tint val="44500"/>
-                  <a:satMod val="160000"/>
-                </a:srgbClr>
-              </a:gs>
-              <a:gs pos="100000">
-                <a:srgbClr val="BED0CF">
-                  <a:tint val="23500"/>
-                  <a:satMod val="160000"/>
-                </a:srgbClr>
-              </a:gs>
-            </a:gsLst>
-            <a:lin ang="16200000" scaled="1"/>
-            <a:tileRect/>
-          </a:gradFill>
-          <a:ln w="19050">
-            <a:solidFill>
-              <a:srgbClr val="597B78"/>
-            </a:solidFill>
-          </a:ln>
-          <a:effectLst/>
-        </p:spPr>
-        <p:style>
-          <a:lnRef idx="1">
-            <a:schemeClr val="accent4"/>
-          </a:lnRef>
-          <a:fillRef idx="2">
-            <a:schemeClr val="accent4"/>
-          </a:fillRef>
-          <a:effectRef idx="1">
-            <a:schemeClr val="accent4"/>
-          </a:effectRef>
-          <a:fontRef idx="minor">
-            <a:schemeClr val="dk1"/>
-          </a:fontRef>
-        </p:style>
-        <p:txBody>
-          <a:bodyPr rtlCol="0" anchor="ctr"/>
-          <a:lstStyle/>
-          <a:p>
-            <a:pPr algn="ctr"/>
-            <a:r>
-              <a:rPr lang="en-US" sz="1050" dirty="0" err="1">
-                <a:solidFill>
-                  <a:srgbClr val="597B78"/>
-                </a:solidFill>
-              </a:rPr>
-              <a:t>QuizCard</a:t>
-            </a:r>
-            <a:endParaRPr lang="en-SG" sz="1050" dirty="0">
-              <a:solidFill>
-                <a:srgbClr val="597B78"/>
-              </a:solidFill>
-            </a:endParaRPr>
-          </a:p>
-        </p:txBody>
-      </p:sp>
-      <p:sp>
-        <p:nvSpPr>
-          <p:cNvPr id="93" name="Flowchart: Decision 96">
-            <a:extLst>
-              <a:ext uri="{FF2B5EF4-FFF2-40B4-BE49-F238E27FC236}">
-                <a16:creationId xmlns:a16="http://schemas.microsoft.com/office/drawing/2014/main" id="{43E50658-243C-4789-ABEB-558E442DD94D}"/>
-              </a:ext>
-            </a:extLst>
-          </p:cNvPr>
-          <p:cNvSpPr/>
-          <p:nvPr/>
-        </p:nvSpPr>
-        <p:spPr>
-          <a:xfrm>
-            <a:off x="4591471" y="2656930"/>
-            <a:ext cx="216000" cy="216000"/>
-          </a:xfrm>
-          <a:prstGeom prst="flowChartDecision">
-            <a:avLst/>
-          </a:prstGeom>
-          <a:solidFill>
-            <a:srgbClr val="597B78"/>
-          </a:solidFill>
-          <a:ln w="19050">
-            <a:solidFill>
-              <a:srgbClr val="597B78"/>
-            </a:solidFill>
-          </a:ln>
-          <a:effectLst/>
-        </p:spPr>
-        <p:style>
-          <a:lnRef idx="1">
-            <a:schemeClr val="accent6"/>
-          </a:lnRef>
-          <a:fillRef idx="2">
-            <a:schemeClr val="accent6"/>
-          </a:fillRef>
-          <a:effectRef idx="1">
-            <a:schemeClr val="accent6"/>
-          </a:effectRef>
-          <a:fontRef idx="minor">
-            <a:schemeClr val="dk1"/>
-          </a:fontRef>
-        </p:style>
-        <p:txBody>
-          <a:bodyPr rtlCol="0" anchor="ctr"/>
-          <a:lstStyle/>
-          <a:p>
-            <a:pPr algn="ctr"/>
-            <a:endParaRPr lang="en-US" sz="1050">
-              <a:solidFill>
-                <a:srgbClr val="597B78"/>
-              </a:solidFill>
-            </a:endParaRPr>
-          </a:p>
-        </p:txBody>
-      </p:sp>
-      <p:cxnSp>
-        <p:nvCxnSpPr>
-          <p:cNvPr id="94" name="Elbow Connector 63">
-            <a:extLst>
-              <a:ext uri="{FF2B5EF4-FFF2-40B4-BE49-F238E27FC236}">
-                <a16:creationId xmlns:a16="http://schemas.microsoft.com/office/drawing/2014/main" id="{2CD2439F-3E8C-4A14-AA85-2E812A49ED7F}"/>
-              </a:ext>
-            </a:extLst>
-          </p:cNvPr>
-          <p:cNvCxnSpPr>
-            <a:cxnSpLocks/>
-            <a:stCxn id="93" idx="3"/>
-            <a:endCxn id="92" idx="1"/>
-          </p:cNvCxnSpPr>
-          <p:nvPr/>
-        </p:nvCxnSpPr>
-        <p:spPr>
-          <a:xfrm flipV="1">
-            <a:off x="4807471" y="2762424"/>
-            <a:ext cx="257975" cy="2506"/>
-          </a:xfrm>
-          <a:prstGeom prst="straightConnector1">
-            <a:avLst/>
-          </a:prstGeom>
-          <a:ln w="19050">
-            <a:solidFill>
-              <a:srgbClr val="597B78"/>
-            </a:solidFill>
-            <a:headEnd type="none" w="med" len="med"/>
-            <a:tailEnd type="arrow" w="med" len="med"/>
-          </a:ln>
-          <a:effectLst/>
-        </p:spPr>
-        <p:style>
-          <a:lnRef idx="1">
-            <a:schemeClr val="accent2"/>
-          </a:lnRef>
-          <a:fillRef idx="2">
-            <a:schemeClr val="accent2"/>
-          </a:fillRef>
-          <a:effectRef idx="1">
-            <a:schemeClr val="accent2"/>
-          </a:effectRef>
-          <a:fontRef idx="minor">
-            <a:schemeClr val="dk1"/>
-          </a:fontRef>
-        </p:style>
-      </p:cxnSp>
-      <p:sp>
-        <p:nvSpPr>
-          <p:cNvPr id="95" name="TextBox 94">
-            <a:extLst>
-              <a:ext uri="{FF2B5EF4-FFF2-40B4-BE49-F238E27FC236}">
-                <a16:creationId xmlns:a16="http://schemas.microsoft.com/office/drawing/2014/main" id="{DA6A8630-39C3-4F0D-A02B-626B83ED57FB}"/>
-              </a:ext>
-            </a:extLst>
-          </p:cNvPr>
-          <p:cNvSpPr txBox="1"/>
-          <p:nvPr/>
-        </p:nvSpPr>
-        <p:spPr>
-          <a:xfrm>
-            <a:off x="4876800" y="2809987"/>
-            <a:ext cx="189257" cy="178683"/>
-          </a:xfrm>
-          <a:prstGeom prst="rect">
-            <a:avLst/>
-          </a:prstGeom>
-          <a:noFill/>
-          <a:ln>
-            <a:noFill/>
-          </a:ln>
-        </p:spPr>
-        <p:txBody>
-          <a:bodyPr wrap="square" lIns="0" tIns="0" rIns="0" bIns="0" rtlCol="0">
-            <a:noAutofit/>
-          </a:bodyPr>
-          <a:lstStyle/>
-          <a:p>
-            <a:pPr algn="ctr"/>
-            <a:r>
-              <a:rPr lang="en-US" sz="1100" dirty="0">
-                <a:solidFill>
-                  <a:srgbClr val="597B78"/>
-                </a:solidFill>
-              </a:rPr>
-              <a:t>1..</a:t>
-            </a:r>
-            <a:endParaRPr lang="en-SG" sz="1100" dirty="0">
-              <a:solidFill>
-                <a:srgbClr val="597B78"/>
-              </a:solidFill>
-            </a:endParaRPr>
-          </a:p>
-        </p:txBody>
-      </p:sp>
-      <p:grpSp>
-        <p:nvGrpSpPr>
-          <p:cNvPr id="96" name="Group 95">
-            <a:extLst>
-              <a:ext uri="{FF2B5EF4-FFF2-40B4-BE49-F238E27FC236}">
-                <a16:creationId xmlns:a16="http://schemas.microsoft.com/office/drawing/2014/main" id="{2FF5D8C8-78FD-4C53-9F15-53DF5F30A09F}"/>
+                <a16:creationId xmlns:a16="http://schemas.microsoft.com/office/drawing/2014/main" id="{181E2ACC-7A8D-4F3F-BE7B-AD90872128A9}"/>
               </a:ext>
             </a:extLst>
           </p:cNvPr>
@@ -4294,19 +4749,19 @@
           <p:nvPr/>
         </p:nvGrpSpPr>
         <p:grpSpPr>
-          <a:xfrm>
-            <a:off x="5972511" y="1640773"/>
-            <a:ext cx="1190625" cy="1098137"/>
-            <a:chOff x="5257800" y="990600"/>
-            <a:chExt cx="1190625" cy="1098137"/>
+          <a:xfrm rot="5400000">
+            <a:off x="1212917" y="1398478"/>
+            <a:ext cx="461680" cy="270504"/>
+            <a:chOff x="2811079" y="2887212"/>
+            <a:chExt cx="391629" cy="270504"/>
           </a:xfrm>
         </p:grpSpPr>
         <p:sp>
           <p:nvSpPr>
-            <p:cNvPr id="98" name="Rectangle 97">
+            <p:cNvPr id="47" name="Isosceles Triangle 102">
               <a:extLst>
                 <a:ext uri="{FF2B5EF4-FFF2-40B4-BE49-F238E27FC236}">
-                  <a16:creationId xmlns:a16="http://schemas.microsoft.com/office/drawing/2014/main" id="{AB7612A6-AB37-43CA-8A6E-6B94D273DEC8}"/>
+                  <a16:creationId xmlns:a16="http://schemas.microsoft.com/office/drawing/2014/main" id="{A82ADB36-A3A2-46A0-9729-4A0933F0890D}"/>
                 </a:ext>
               </a:extLst>
             </p:cNvPr>
@@ -4314,1208 +4769,23 @@
             <p:nvPr/>
           </p:nvSpPr>
           <p:spPr>
-            <a:xfrm>
-              <a:off x="5257800" y="990600"/>
-              <a:ext cx="1190625" cy="381000"/>
+            <a:xfrm rot="16200000">
+              <a:off x="2763589" y="2934702"/>
+              <a:ext cx="270504" cy="175523"/>
             </a:xfrm>
-            <a:prstGeom prst="rect">
+            <a:prstGeom prst="triangle">
               <a:avLst/>
             </a:prstGeom>
-            <a:gradFill flip="none" rotWithShape="1">
-              <a:gsLst>
-                <a:gs pos="0">
-                  <a:srgbClr val="BED0CF">
-                    <a:tint val="66000"/>
-                    <a:satMod val="160000"/>
-                  </a:srgbClr>
-                </a:gs>
-                <a:gs pos="50000">
-                  <a:srgbClr val="BED0CF">
-                    <a:tint val="44500"/>
-                    <a:satMod val="160000"/>
-                  </a:srgbClr>
-                </a:gs>
-                <a:gs pos="100000">
-                  <a:srgbClr val="BED0CF">
-                    <a:tint val="23500"/>
-                    <a:satMod val="160000"/>
-                  </a:srgbClr>
-                </a:gs>
-              </a:gsLst>
-              <a:lin ang="16200000" scaled="1"/>
-              <a:tileRect/>
-            </a:gradFill>
+            <a:solidFill>
+              <a:schemeClr val="bg1">
+                <a:lumMod val="50000"/>
+              </a:schemeClr>
+            </a:solidFill>
             <a:ln w="19050">
               <a:solidFill>
-                <a:srgbClr val="597B78"/>
-              </a:solidFill>
-            </a:ln>
-          </p:spPr>
-          <p:style>
-            <a:lnRef idx="2">
-              <a:schemeClr val="accent1">
-                <a:shade val="50000"/>
-              </a:schemeClr>
-            </a:lnRef>
-            <a:fillRef idx="1">
-              <a:schemeClr val="accent1"/>
-            </a:fillRef>
-            <a:effectRef idx="0">
-              <a:schemeClr val="accent1"/>
-            </a:effectRef>
-            <a:fontRef idx="minor">
-              <a:schemeClr val="lt1"/>
-            </a:fontRef>
-          </p:style>
-          <p:txBody>
-            <a:bodyPr rtlCol="0" anchor="ctr"/>
-            <a:lstStyle/>
-            <a:p>
-              <a:pPr algn="ctr"/>
-              <a:r>
-                <a:rPr lang="en-SG" sz="1050" dirty="0">
-                  <a:solidFill>
-                    <a:srgbClr val="597B78"/>
-                  </a:solidFill>
-                </a:rPr>
-                <a:t>&lt;&lt;enumeration&gt;&gt;</a:t>
-              </a:r>
-              <a:br>
-                <a:rPr lang="en-SG" sz="1050" dirty="0">
-                  <a:solidFill>
-                    <a:srgbClr val="597B78"/>
-                  </a:solidFill>
-                </a:rPr>
-              </a:br>
-              <a:r>
-                <a:rPr lang="en-SG" sz="1050" dirty="0">
-                  <a:solidFill>
-                    <a:srgbClr val="597B78"/>
-                  </a:solidFill>
-                </a:rPr>
-                <a:t>Mode</a:t>
-              </a:r>
-            </a:p>
-          </p:txBody>
-        </p:sp>
-        <p:sp>
-          <p:nvSpPr>
-            <p:cNvPr id="101" name="Rectangle 100">
-              <a:extLst>
-                <a:ext uri="{FF2B5EF4-FFF2-40B4-BE49-F238E27FC236}">
-                  <a16:creationId xmlns:a16="http://schemas.microsoft.com/office/drawing/2014/main" id="{49EE6939-5D7A-496A-8049-A5039D6C7ED8}"/>
-                </a:ext>
-              </a:extLst>
-            </p:cNvPr>
-            <p:cNvSpPr/>
-            <p:nvPr/>
-          </p:nvSpPr>
-          <p:spPr>
-            <a:xfrm>
-              <a:off x="5257800" y="1371600"/>
-              <a:ext cx="1190625" cy="717137"/>
-            </a:xfrm>
-            <a:prstGeom prst="rect">
-              <a:avLst/>
-            </a:prstGeom>
-            <a:gradFill flip="none" rotWithShape="1">
-              <a:gsLst>
-                <a:gs pos="0">
-                  <a:srgbClr val="BED0CF">
-                    <a:tint val="66000"/>
-                    <a:satMod val="160000"/>
-                  </a:srgbClr>
-                </a:gs>
-                <a:gs pos="50000">
-                  <a:srgbClr val="BED0CF">
-                    <a:tint val="44500"/>
-                    <a:satMod val="160000"/>
-                  </a:srgbClr>
-                </a:gs>
-                <a:gs pos="100000">
-                  <a:srgbClr val="BED0CF">
-                    <a:tint val="23500"/>
-                    <a:satMod val="160000"/>
-                  </a:srgbClr>
-                </a:gs>
-              </a:gsLst>
-              <a:lin ang="16200000" scaled="1"/>
-              <a:tileRect/>
-            </a:gradFill>
-            <a:ln w="19050">
-              <a:solidFill>
-                <a:srgbClr val="597B78"/>
-              </a:solidFill>
-            </a:ln>
-          </p:spPr>
-          <p:style>
-            <a:lnRef idx="2">
-              <a:schemeClr val="accent1">
-                <a:shade val="50000"/>
-              </a:schemeClr>
-            </a:lnRef>
-            <a:fillRef idx="1">
-              <a:schemeClr val="accent1"/>
-            </a:fillRef>
-            <a:effectRef idx="0">
-              <a:schemeClr val="accent1"/>
-            </a:effectRef>
-            <a:fontRef idx="minor">
-              <a:schemeClr val="lt1"/>
-            </a:fontRef>
-          </p:style>
-          <p:txBody>
-            <a:bodyPr rtlCol="0" anchor="ctr"/>
-            <a:lstStyle/>
-            <a:p>
-              <a:r>
-                <a:rPr lang="en-SG" sz="1050" dirty="0">
-                  <a:solidFill>
-                    <a:srgbClr val="597B78"/>
-                  </a:solidFill>
-                </a:rPr>
-                <a:t>LEARN</a:t>
-              </a:r>
-            </a:p>
-            <a:p>
-              <a:r>
-                <a:rPr lang="en-SG" sz="1050" dirty="0">
-                  <a:solidFill>
-                    <a:srgbClr val="597B78"/>
-                  </a:solidFill>
-                </a:rPr>
-                <a:t>REVIEW</a:t>
-              </a:r>
-            </a:p>
-            <a:p>
-              <a:r>
-                <a:rPr lang="en-SG" sz="1050" dirty="0">
-                  <a:solidFill>
-                    <a:srgbClr val="597B78"/>
-                  </a:solidFill>
-                </a:rPr>
-                <a:t>PREVIEW</a:t>
-              </a:r>
-              <a:br>
-                <a:rPr lang="en-SG" sz="1050" dirty="0">
-                  <a:solidFill>
-                    <a:srgbClr val="597B78"/>
-                  </a:solidFill>
-                </a:rPr>
-              </a:br>
-              <a:r>
-                <a:rPr lang="en-SG" sz="1050" dirty="0">
-                  <a:solidFill>
-                    <a:srgbClr val="597B78"/>
-                  </a:solidFill>
-                </a:rPr>
-                <a:t>DIFFICULT</a:t>
-              </a:r>
-            </a:p>
-          </p:txBody>
-        </p:sp>
-      </p:grpSp>
-      <p:sp>
-        <p:nvSpPr>
-          <p:cNvPr id="20" name="Rectangle 62">
-            <a:extLst>
-              <a:ext uri="{FF2B5EF4-FFF2-40B4-BE49-F238E27FC236}">
-                <a16:creationId xmlns:a16="http://schemas.microsoft.com/office/drawing/2014/main" id="{5EF0C71E-E46B-4CEA-8D36-496304EC6633}"/>
-              </a:ext>
-            </a:extLst>
-          </p:cNvPr>
-          <p:cNvSpPr/>
-          <p:nvPr/>
-        </p:nvSpPr>
-        <p:spPr>
-          <a:xfrm rot="16200000">
-            <a:off x="1107519" y="3056326"/>
-            <a:ext cx="1093635" cy="346760"/>
-          </a:xfrm>
-          <a:prstGeom prst="rect">
-            <a:avLst/>
-          </a:prstGeom>
-          <a:gradFill flip="none" rotWithShape="1">
-            <a:gsLst>
-              <a:gs pos="0">
-                <a:srgbClr val="BED0CF">
-                  <a:tint val="66000"/>
-                  <a:satMod val="160000"/>
-                </a:srgbClr>
-              </a:gs>
-              <a:gs pos="50000">
-                <a:srgbClr val="BED0CF">
-                  <a:tint val="44500"/>
-                  <a:satMod val="160000"/>
-                </a:srgbClr>
-              </a:gs>
-              <a:gs pos="100000">
-                <a:srgbClr val="BED0CF">
-                  <a:tint val="23500"/>
-                  <a:satMod val="160000"/>
-                </a:srgbClr>
-              </a:gs>
-            </a:gsLst>
-            <a:lin ang="16200000" scaled="1"/>
-            <a:tileRect/>
-          </a:gradFill>
-          <a:ln w="19050">
-            <a:solidFill>
-              <a:srgbClr val="597B78"/>
-            </a:solidFill>
-          </a:ln>
-          <a:effectLst/>
-        </p:spPr>
-        <p:style>
-          <a:lnRef idx="1">
-            <a:schemeClr val="accent2"/>
-          </a:lnRef>
-          <a:fillRef idx="2">
-            <a:schemeClr val="accent2"/>
-          </a:fillRef>
-          <a:effectRef idx="1">
-            <a:schemeClr val="accent2"/>
-          </a:effectRef>
-          <a:fontRef idx="minor">
-            <a:schemeClr val="dk1"/>
-          </a:fontRef>
-        </p:style>
-        <p:txBody>
-          <a:bodyPr rtlCol="0" anchor="ctr"/>
-          <a:lstStyle/>
-          <a:p>
-            <a:pPr algn="ctr"/>
-            <a:r>
-              <a:rPr lang="en-US" sz="1050" dirty="0">
-                <a:solidFill>
-                  <a:srgbClr val="597B78"/>
-                </a:solidFill>
-              </a:rPr>
-              <a:t>&lt;&lt;interface&gt;&gt;</a:t>
-            </a:r>
-          </a:p>
-          <a:p>
-            <a:pPr algn="ctr"/>
-            <a:r>
-              <a:rPr lang="en-US" sz="1050" dirty="0">
-                <a:solidFill>
-                  <a:srgbClr val="597B78"/>
-                </a:solidFill>
-              </a:rPr>
-              <a:t>Model</a:t>
-            </a:r>
-            <a:endParaRPr lang="en-SG" sz="1050" dirty="0">
-              <a:solidFill>
-                <a:srgbClr val="597B78"/>
-              </a:solidFill>
-            </a:endParaRPr>
-          </a:p>
-        </p:txBody>
-      </p:sp>
-      <p:sp>
-        <p:nvSpPr>
-          <p:cNvPr id="22" name="Isosceles Triangle 102">
-            <a:extLst>
-              <a:ext uri="{FF2B5EF4-FFF2-40B4-BE49-F238E27FC236}">
-                <a16:creationId xmlns:a16="http://schemas.microsoft.com/office/drawing/2014/main" id="{365DB3E8-AC4C-4F4E-BE95-912E294B9992}"/>
-              </a:ext>
-            </a:extLst>
-          </p:cNvPr>
-          <p:cNvSpPr/>
-          <p:nvPr/>
-        </p:nvSpPr>
-        <p:spPr>
-          <a:xfrm rot="16200000">
-            <a:off x="1795012" y="3147415"/>
-            <a:ext cx="270504" cy="175523"/>
-          </a:xfrm>
-          <a:prstGeom prst="triangle">
-            <a:avLst/>
-          </a:prstGeom>
-          <a:solidFill>
-            <a:srgbClr val="597B78"/>
-          </a:solidFill>
-          <a:ln w="19050">
-            <a:solidFill>
-              <a:srgbClr val="597B78"/>
-            </a:solidFill>
-          </a:ln>
-          <a:effectLst/>
-        </p:spPr>
-        <p:style>
-          <a:lnRef idx="1">
-            <a:schemeClr val="accent6"/>
-          </a:lnRef>
-          <a:fillRef idx="2">
-            <a:schemeClr val="accent6"/>
-          </a:fillRef>
-          <a:effectRef idx="1">
-            <a:schemeClr val="accent6"/>
-          </a:effectRef>
-          <a:fontRef idx="minor">
-            <a:schemeClr val="dk1"/>
-          </a:fontRef>
-        </p:style>
-        <p:txBody>
-          <a:bodyPr rtlCol="0" anchor="ctr"/>
-          <a:lstStyle/>
-          <a:p>
-            <a:pPr algn="ctr"/>
-            <a:endParaRPr lang="en-SG" sz="1050">
-              <a:solidFill>
-                <a:srgbClr val="597B78"/>
-              </a:solidFill>
-            </a:endParaRPr>
-          </a:p>
-        </p:txBody>
-      </p:sp>
-      <p:cxnSp>
-        <p:nvCxnSpPr>
-          <p:cNvPr id="23" name="Straight Connector 22">
-            <a:extLst>
-              <a:ext uri="{FF2B5EF4-FFF2-40B4-BE49-F238E27FC236}">
-                <a16:creationId xmlns:a16="http://schemas.microsoft.com/office/drawing/2014/main" id="{6735349C-D785-44FE-A62A-D5F128604A06}"/>
-              </a:ext>
-            </a:extLst>
-          </p:cNvPr>
-          <p:cNvCxnSpPr>
-            <a:cxnSpLocks/>
-            <a:stCxn id="22" idx="3"/>
-          </p:cNvCxnSpPr>
-          <p:nvPr/>
-        </p:nvCxnSpPr>
-        <p:spPr>
-          <a:xfrm flipV="1">
-            <a:off x="2018026" y="3229706"/>
-            <a:ext cx="207476" cy="5471"/>
-          </a:xfrm>
-          <a:prstGeom prst="line">
-            <a:avLst/>
-          </a:prstGeom>
-          <a:ln w="19050">
-            <a:solidFill>
-              <a:srgbClr val="597B78"/>
-            </a:solidFill>
-            <a:prstDash val="sysDot"/>
-            <a:headEnd type="none" w="med" len="med"/>
-            <a:tailEnd type="none" w="med" len="med"/>
-          </a:ln>
-          <a:effectLst/>
-        </p:spPr>
-        <p:style>
-          <a:lnRef idx="1">
-            <a:schemeClr val="accent2"/>
-          </a:lnRef>
-          <a:fillRef idx="2">
-            <a:schemeClr val="accent2"/>
-          </a:fillRef>
-          <a:effectRef idx="1">
-            <a:schemeClr val="accent2"/>
-          </a:effectRef>
-          <a:fontRef idx="minor">
-            <a:schemeClr val="dk1"/>
-          </a:fontRef>
-        </p:style>
-      </p:cxnSp>
-      <p:cxnSp>
-        <p:nvCxnSpPr>
-          <p:cNvPr id="24" name="Straight Arrow Connector 23">
-            <a:extLst>
-              <a:ext uri="{FF2B5EF4-FFF2-40B4-BE49-F238E27FC236}">
-                <a16:creationId xmlns:a16="http://schemas.microsoft.com/office/drawing/2014/main" id="{9B7A24CB-45B0-41E9-9D6C-5813DF4A64D7}"/>
-              </a:ext>
-            </a:extLst>
-          </p:cNvPr>
-          <p:cNvCxnSpPr>
-            <a:cxnSpLocks/>
-            <a:stCxn id="25" idx="3"/>
-            <a:endCxn id="27" idx="1"/>
-          </p:cNvCxnSpPr>
-          <p:nvPr/>
-        </p:nvCxnSpPr>
-        <p:spPr>
-          <a:xfrm flipV="1">
-            <a:off x="3561321" y="3223984"/>
-            <a:ext cx="233298" cy="1428"/>
-          </a:xfrm>
-          <a:prstGeom prst="straightConnector1">
-            <a:avLst/>
-          </a:prstGeom>
-          <a:ln w="19050">
-            <a:solidFill>
-              <a:srgbClr val="597B78"/>
-            </a:solidFill>
-            <a:headEnd type="none" w="med" len="med"/>
-            <a:tailEnd type="arrow" w="med" len="med"/>
-          </a:ln>
-          <a:effectLst/>
-        </p:spPr>
-        <p:style>
-          <a:lnRef idx="1">
-            <a:schemeClr val="accent2"/>
-          </a:lnRef>
-          <a:fillRef idx="2">
-            <a:schemeClr val="accent2"/>
-          </a:fillRef>
-          <a:effectRef idx="1">
-            <a:schemeClr val="accent2"/>
-          </a:effectRef>
-          <a:fontRef idx="minor">
-            <a:schemeClr val="dk1"/>
-          </a:fontRef>
-        </p:style>
-      </p:cxnSp>
-      <p:sp>
-        <p:nvSpPr>
-          <p:cNvPr id="25" name="Flowchart: Decision 96">
-            <a:extLst>
-              <a:ext uri="{FF2B5EF4-FFF2-40B4-BE49-F238E27FC236}">
-                <a16:creationId xmlns:a16="http://schemas.microsoft.com/office/drawing/2014/main" id="{206A9DE9-0FD4-40CC-9294-3D0AEEFC157C}"/>
-              </a:ext>
-            </a:extLst>
-          </p:cNvPr>
-          <p:cNvSpPr/>
-          <p:nvPr/>
-        </p:nvSpPr>
-        <p:spPr>
-          <a:xfrm>
-            <a:off x="3345321" y="3117412"/>
-            <a:ext cx="216000" cy="216000"/>
-          </a:xfrm>
-          <a:prstGeom prst="flowChartDecision">
-            <a:avLst/>
-          </a:prstGeom>
-          <a:noFill/>
-          <a:ln w="19050">
-            <a:solidFill>
-              <a:srgbClr val="597B78"/>
-            </a:solidFill>
-          </a:ln>
-          <a:effectLst/>
-        </p:spPr>
-        <p:style>
-          <a:lnRef idx="1">
-            <a:schemeClr val="accent6"/>
-          </a:lnRef>
-          <a:fillRef idx="2">
-            <a:schemeClr val="accent6"/>
-          </a:fillRef>
-          <a:effectRef idx="1">
-            <a:schemeClr val="accent6"/>
-          </a:effectRef>
-          <a:fontRef idx="minor">
-            <a:schemeClr val="dk1"/>
-          </a:fontRef>
-        </p:style>
-        <p:txBody>
-          <a:bodyPr rtlCol="0" anchor="ctr"/>
-          <a:lstStyle/>
-          <a:p>
-            <a:pPr algn="ctr"/>
-            <a:endParaRPr lang="en-US" sz="1050">
-              <a:solidFill>
-                <a:srgbClr val="597B78"/>
-              </a:solidFill>
-            </a:endParaRPr>
-          </a:p>
-        </p:txBody>
-      </p:sp>
-      <p:sp>
-        <p:nvSpPr>
-          <p:cNvPr id="26" name="TextBox 25">
-            <a:extLst>
-              <a:ext uri="{FF2B5EF4-FFF2-40B4-BE49-F238E27FC236}">
-                <a16:creationId xmlns:a16="http://schemas.microsoft.com/office/drawing/2014/main" id="{CDD27E4B-3E21-4BC7-8CB5-CD4E2FBA118E}"/>
-              </a:ext>
-            </a:extLst>
-          </p:cNvPr>
-          <p:cNvSpPr txBox="1"/>
-          <p:nvPr/>
-        </p:nvSpPr>
-        <p:spPr>
-          <a:xfrm>
-            <a:off x="3616204" y="3274108"/>
-            <a:ext cx="189257" cy="178683"/>
-          </a:xfrm>
-          <a:prstGeom prst="rect">
-            <a:avLst/>
-          </a:prstGeom>
-          <a:noFill/>
-        </p:spPr>
-        <p:txBody>
-          <a:bodyPr wrap="square" lIns="0" tIns="0" rIns="0" bIns="0" rtlCol="0">
-            <a:noAutofit/>
-          </a:bodyPr>
-          <a:lstStyle/>
-          <a:p>
-            <a:pPr algn="ctr"/>
-            <a:r>
-              <a:rPr lang="en-US" sz="1100" dirty="0">
-                <a:solidFill>
-                  <a:srgbClr val="597B78"/>
-                </a:solidFill>
-              </a:rPr>
-              <a:t>1</a:t>
-            </a:r>
-            <a:endParaRPr lang="en-SG" sz="1100" dirty="0">
-              <a:solidFill>
-                <a:srgbClr val="597B78"/>
-              </a:solidFill>
-            </a:endParaRPr>
-          </a:p>
-        </p:txBody>
-      </p:sp>
-      <p:sp>
-        <p:nvSpPr>
-          <p:cNvPr id="27" name="Rectangle 8">
-            <a:extLst>
-              <a:ext uri="{FF2B5EF4-FFF2-40B4-BE49-F238E27FC236}">
-                <a16:creationId xmlns:a16="http://schemas.microsoft.com/office/drawing/2014/main" id="{D6832160-4177-4296-A5D2-39FE94C63F5E}"/>
-              </a:ext>
-            </a:extLst>
-          </p:cNvPr>
-          <p:cNvSpPr/>
-          <p:nvPr/>
-        </p:nvSpPr>
-        <p:spPr>
-          <a:xfrm>
-            <a:off x="3794619" y="3082580"/>
-            <a:ext cx="790812" cy="282808"/>
-          </a:xfrm>
-          <a:prstGeom prst="rect">
-            <a:avLst/>
-          </a:prstGeom>
-          <a:gradFill flip="none" rotWithShape="1">
-            <a:gsLst>
-              <a:gs pos="0">
-                <a:srgbClr val="BED0CF">
-                  <a:tint val="66000"/>
-                  <a:satMod val="160000"/>
-                </a:srgbClr>
-              </a:gs>
-              <a:gs pos="50000">
-                <a:srgbClr val="BED0CF">
-                  <a:tint val="44500"/>
-                  <a:satMod val="160000"/>
-                </a:srgbClr>
-              </a:gs>
-              <a:gs pos="100000">
-                <a:srgbClr val="BED0CF">
-                  <a:tint val="23500"/>
-                  <a:satMod val="160000"/>
-                </a:srgbClr>
-              </a:gs>
-            </a:gsLst>
-            <a:lin ang="16200000" scaled="1"/>
-            <a:tileRect/>
-          </a:gradFill>
-          <a:ln w="19050">
-            <a:solidFill>
-              <a:srgbClr val="597B78"/>
-            </a:solidFill>
-          </a:ln>
-          <a:effectLst/>
-        </p:spPr>
-        <p:style>
-          <a:lnRef idx="1">
-            <a:schemeClr val="accent4"/>
-          </a:lnRef>
-          <a:fillRef idx="2">
-            <a:schemeClr val="accent4"/>
-          </a:fillRef>
-          <a:effectRef idx="1">
-            <a:schemeClr val="accent4"/>
-          </a:effectRef>
-          <a:fontRef idx="minor">
-            <a:schemeClr val="dk1"/>
-          </a:fontRef>
-        </p:style>
-        <p:txBody>
-          <a:bodyPr rtlCol="0" anchor="ctr"/>
-          <a:lstStyle/>
-          <a:p>
-            <a:pPr algn="ctr"/>
-            <a:r>
-              <a:rPr lang="en-US" sz="1050" dirty="0">
-                <a:solidFill>
-                  <a:srgbClr val="597B78"/>
-                </a:solidFill>
-              </a:rPr>
-              <a:t>Session</a:t>
-            </a:r>
-            <a:endParaRPr lang="en-SG" sz="1050" dirty="0">
-              <a:solidFill>
-                <a:srgbClr val="597B78"/>
-              </a:solidFill>
-            </a:endParaRPr>
-          </a:p>
-        </p:txBody>
-      </p:sp>
-      <p:sp>
-        <p:nvSpPr>
-          <p:cNvPr id="28" name="Rectangle 8">
-            <a:extLst>
-              <a:ext uri="{FF2B5EF4-FFF2-40B4-BE49-F238E27FC236}">
-                <a16:creationId xmlns:a16="http://schemas.microsoft.com/office/drawing/2014/main" id="{18D896D9-6754-4AC7-9A42-834C9292B3BA}"/>
-              </a:ext>
-            </a:extLst>
-          </p:cNvPr>
-          <p:cNvSpPr/>
-          <p:nvPr/>
-        </p:nvSpPr>
-        <p:spPr>
-          <a:xfrm>
-            <a:off x="5065445" y="3080612"/>
-            <a:ext cx="698200" cy="282808"/>
-          </a:xfrm>
-          <a:prstGeom prst="rect">
-            <a:avLst/>
-          </a:prstGeom>
-          <a:gradFill flip="none" rotWithShape="1">
-            <a:gsLst>
-              <a:gs pos="0">
-                <a:srgbClr val="BED0CF">
-                  <a:tint val="66000"/>
-                  <a:satMod val="160000"/>
-                </a:srgbClr>
-              </a:gs>
-              <a:gs pos="50000">
-                <a:srgbClr val="BED0CF">
-                  <a:tint val="44500"/>
-                  <a:satMod val="160000"/>
-                </a:srgbClr>
-              </a:gs>
-              <a:gs pos="100000">
-                <a:srgbClr val="BED0CF">
-                  <a:tint val="23500"/>
-                  <a:satMod val="160000"/>
-                </a:srgbClr>
-              </a:gs>
-            </a:gsLst>
-            <a:lin ang="16200000" scaled="1"/>
-            <a:tileRect/>
-          </a:gradFill>
-          <a:ln w="19050">
-            <a:solidFill>
-              <a:srgbClr val="597B78"/>
-            </a:solidFill>
-          </a:ln>
-          <a:effectLst/>
-        </p:spPr>
-        <p:style>
-          <a:lnRef idx="1">
-            <a:schemeClr val="accent4"/>
-          </a:lnRef>
-          <a:fillRef idx="2">
-            <a:schemeClr val="accent4"/>
-          </a:fillRef>
-          <a:effectRef idx="1">
-            <a:schemeClr val="accent4"/>
-          </a:effectRef>
-          <a:fontRef idx="minor">
-            <a:schemeClr val="dk1"/>
-          </a:fontRef>
-        </p:style>
-        <p:txBody>
-          <a:bodyPr rtlCol="0" anchor="ctr"/>
-          <a:lstStyle/>
-          <a:p>
-            <a:pPr algn="ctr"/>
-            <a:r>
-              <a:rPr lang="en-US" sz="1050" dirty="0" err="1">
-                <a:solidFill>
-                  <a:srgbClr val="597B78"/>
-                </a:solidFill>
-              </a:rPr>
-              <a:t>SrsCard</a:t>
-            </a:r>
-            <a:endParaRPr lang="en-SG" sz="1050" dirty="0">
-              <a:solidFill>
-                <a:srgbClr val="597B78"/>
-              </a:solidFill>
-            </a:endParaRPr>
-          </a:p>
-        </p:txBody>
-      </p:sp>
-      <p:sp>
-        <p:nvSpPr>
-          <p:cNvPr id="29" name="Flowchart: Decision 96">
-            <a:extLst>
-              <a:ext uri="{FF2B5EF4-FFF2-40B4-BE49-F238E27FC236}">
-                <a16:creationId xmlns:a16="http://schemas.microsoft.com/office/drawing/2014/main" id="{4C017955-09FB-4077-BE16-EF592F9E48E6}"/>
-              </a:ext>
-            </a:extLst>
-          </p:cNvPr>
-          <p:cNvSpPr/>
-          <p:nvPr/>
-        </p:nvSpPr>
-        <p:spPr>
-          <a:xfrm>
-            <a:off x="4591471" y="3115984"/>
-            <a:ext cx="216000" cy="216000"/>
-          </a:xfrm>
-          <a:prstGeom prst="flowChartDecision">
-            <a:avLst/>
-          </a:prstGeom>
-          <a:solidFill>
-            <a:srgbClr val="597B78"/>
-          </a:solidFill>
-          <a:ln w="19050">
-            <a:solidFill>
-              <a:srgbClr val="597B78"/>
-            </a:solidFill>
-          </a:ln>
-          <a:effectLst/>
-        </p:spPr>
-        <p:style>
-          <a:lnRef idx="1">
-            <a:schemeClr val="accent6"/>
-          </a:lnRef>
-          <a:fillRef idx="2">
-            <a:schemeClr val="accent6"/>
-          </a:fillRef>
-          <a:effectRef idx="1">
-            <a:schemeClr val="accent6"/>
-          </a:effectRef>
-          <a:fontRef idx="minor">
-            <a:schemeClr val="dk1"/>
-          </a:fontRef>
-        </p:style>
-        <p:txBody>
-          <a:bodyPr rtlCol="0" anchor="ctr"/>
-          <a:lstStyle/>
-          <a:p>
-            <a:pPr algn="ctr"/>
-            <a:endParaRPr lang="en-US" sz="1050">
-              <a:solidFill>
-                <a:srgbClr val="597B78"/>
-              </a:solidFill>
-            </a:endParaRPr>
-          </a:p>
-        </p:txBody>
-      </p:sp>
-      <p:cxnSp>
-        <p:nvCxnSpPr>
-          <p:cNvPr id="30" name="Elbow Connector 63">
-            <a:extLst>
-              <a:ext uri="{FF2B5EF4-FFF2-40B4-BE49-F238E27FC236}">
-                <a16:creationId xmlns:a16="http://schemas.microsoft.com/office/drawing/2014/main" id="{FE181668-9144-4468-ABB0-D1B3CA9FB5B2}"/>
-              </a:ext>
-            </a:extLst>
-          </p:cNvPr>
-          <p:cNvCxnSpPr>
-            <a:cxnSpLocks/>
-            <a:stCxn id="29" idx="3"/>
-            <a:endCxn id="28" idx="1"/>
-          </p:cNvCxnSpPr>
-          <p:nvPr/>
-        </p:nvCxnSpPr>
-        <p:spPr>
-          <a:xfrm flipV="1">
-            <a:off x="4807471" y="3222016"/>
-            <a:ext cx="257974" cy="1968"/>
-          </a:xfrm>
-          <a:prstGeom prst="straightConnector1">
-            <a:avLst/>
-          </a:prstGeom>
-          <a:ln w="19050">
-            <a:solidFill>
-              <a:srgbClr val="597B78"/>
-            </a:solidFill>
-            <a:headEnd type="none" w="med" len="med"/>
-            <a:tailEnd type="arrow" w="med" len="med"/>
-          </a:ln>
-          <a:effectLst/>
-        </p:spPr>
-        <p:style>
-          <a:lnRef idx="1">
-            <a:schemeClr val="accent2"/>
-          </a:lnRef>
-          <a:fillRef idx="2">
-            <a:schemeClr val="accent2"/>
-          </a:fillRef>
-          <a:effectRef idx="1">
-            <a:schemeClr val="accent2"/>
-          </a:effectRef>
-          <a:fontRef idx="minor">
-            <a:schemeClr val="dk1"/>
-          </a:fontRef>
-        </p:style>
-      </p:cxnSp>
-      <p:sp>
-        <p:nvSpPr>
-          <p:cNvPr id="31" name="TextBox 30">
-            <a:extLst>
-              <a:ext uri="{FF2B5EF4-FFF2-40B4-BE49-F238E27FC236}">
-                <a16:creationId xmlns:a16="http://schemas.microsoft.com/office/drawing/2014/main" id="{074B6BD6-1D7D-4641-936E-427FC1C157A5}"/>
-              </a:ext>
-            </a:extLst>
-          </p:cNvPr>
-          <p:cNvSpPr txBox="1"/>
-          <p:nvPr/>
-        </p:nvSpPr>
-        <p:spPr>
-          <a:xfrm>
-            <a:off x="4876800" y="3290769"/>
-            <a:ext cx="189257" cy="178683"/>
-          </a:xfrm>
-          <a:prstGeom prst="rect">
-            <a:avLst/>
-          </a:prstGeom>
-          <a:noFill/>
-          <a:ln>
-            <a:noFill/>
-          </a:ln>
-        </p:spPr>
-        <p:txBody>
-          <a:bodyPr wrap="square" lIns="0" tIns="0" rIns="0" bIns="0" rtlCol="0">
-            <a:noAutofit/>
-          </a:bodyPr>
-          <a:lstStyle/>
-          <a:p>
-            <a:pPr algn="ctr"/>
-            <a:r>
-              <a:rPr lang="en-US" sz="1100" dirty="0">
-                <a:solidFill>
-                  <a:srgbClr val="597B78"/>
-                </a:solidFill>
-              </a:rPr>
-              <a:t>1..</a:t>
-            </a:r>
-            <a:endParaRPr lang="en-SG" sz="1100" dirty="0">
-              <a:solidFill>
-                <a:srgbClr val="597B78"/>
-              </a:solidFill>
-            </a:endParaRPr>
-          </a:p>
-        </p:txBody>
-      </p:sp>
-      <p:cxnSp>
-        <p:nvCxnSpPr>
-          <p:cNvPr id="32" name="Straight Arrow Connector 31">
-            <a:extLst>
-              <a:ext uri="{FF2B5EF4-FFF2-40B4-BE49-F238E27FC236}">
-                <a16:creationId xmlns:a16="http://schemas.microsoft.com/office/drawing/2014/main" id="{4F0BD24D-10B5-4478-BF47-0778D0A6D921}"/>
-              </a:ext>
-            </a:extLst>
-          </p:cNvPr>
-          <p:cNvCxnSpPr>
-            <a:cxnSpLocks/>
-            <a:stCxn id="33" idx="3"/>
-            <a:endCxn id="35" idx="1"/>
-          </p:cNvCxnSpPr>
-          <p:nvPr/>
-        </p:nvCxnSpPr>
-        <p:spPr>
-          <a:xfrm>
-            <a:off x="3558338" y="3734754"/>
-            <a:ext cx="233297" cy="0"/>
-          </a:xfrm>
-          <a:prstGeom prst="straightConnector1">
-            <a:avLst/>
-          </a:prstGeom>
-          <a:ln w="19050">
-            <a:solidFill>
-              <a:srgbClr val="597B78"/>
-            </a:solidFill>
-            <a:headEnd type="none" w="med" len="med"/>
-            <a:tailEnd type="arrow" w="med" len="med"/>
-          </a:ln>
-          <a:effectLst/>
-        </p:spPr>
-        <p:style>
-          <a:lnRef idx="1">
-            <a:schemeClr val="accent2"/>
-          </a:lnRef>
-          <a:fillRef idx="2">
-            <a:schemeClr val="accent2"/>
-          </a:fillRef>
-          <a:effectRef idx="1">
-            <a:schemeClr val="accent2"/>
-          </a:effectRef>
-          <a:fontRef idx="minor">
-            <a:schemeClr val="dk1"/>
-          </a:fontRef>
-        </p:style>
-      </p:cxnSp>
-      <p:sp>
-        <p:nvSpPr>
-          <p:cNvPr id="33" name="Flowchart: Decision 96">
-            <a:extLst>
-              <a:ext uri="{FF2B5EF4-FFF2-40B4-BE49-F238E27FC236}">
-                <a16:creationId xmlns:a16="http://schemas.microsoft.com/office/drawing/2014/main" id="{53FB2A32-D4A5-4FA8-80F3-7EFA5AFF4E80}"/>
-              </a:ext>
-            </a:extLst>
-          </p:cNvPr>
-          <p:cNvSpPr/>
-          <p:nvPr/>
-        </p:nvSpPr>
-        <p:spPr>
-          <a:xfrm>
-            <a:off x="3342338" y="3626754"/>
-            <a:ext cx="216000" cy="216000"/>
-          </a:xfrm>
-          <a:prstGeom prst="flowChartDecision">
-            <a:avLst/>
-          </a:prstGeom>
-          <a:noFill/>
-          <a:ln w="19050">
-            <a:solidFill>
-              <a:srgbClr val="597B78"/>
-            </a:solidFill>
-          </a:ln>
-          <a:effectLst/>
-        </p:spPr>
-        <p:style>
-          <a:lnRef idx="1">
-            <a:schemeClr val="accent6"/>
-          </a:lnRef>
-          <a:fillRef idx="2">
-            <a:schemeClr val="accent6"/>
-          </a:fillRef>
-          <a:effectRef idx="1">
-            <a:schemeClr val="accent6"/>
-          </a:effectRef>
-          <a:fontRef idx="minor">
-            <a:schemeClr val="dk1"/>
-          </a:fontRef>
-        </p:style>
-        <p:txBody>
-          <a:bodyPr rtlCol="0" anchor="ctr"/>
-          <a:lstStyle/>
-          <a:p>
-            <a:pPr algn="ctr"/>
-            <a:endParaRPr lang="en-US" sz="1050">
-              <a:solidFill>
-                <a:srgbClr val="597B78"/>
-              </a:solidFill>
-            </a:endParaRPr>
-          </a:p>
-        </p:txBody>
-      </p:sp>
-      <p:sp>
-        <p:nvSpPr>
-          <p:cNvPr id="34" name="TextBox 33">
-            <a:extLst>
-              <a:ext uri="{FF2B5EF4-FFF2-40B4-BE49-F238E27FC236}">
-                <a16:creationId xmlns:a16="http://schemas.microsoft.com/office/drawing/2014/main" id="{60B985CA-0A76-42D8-B737-8C442B18FCD2}"/>
-              </a:ext>
-            </a:extLst>
-          </p:cNvPr>
-          <p:cNvSpPr txBox="1"/>
-          <p:nvPr/>
-        </p:nvSpPr>
-        <p:spPr>
-          <a:xfrm>
-            <a:off x="3613221" y="3783450"/>
-            <a:ext cx="189257" cy="178683"/>
-          </a:xfrm>
-          <a:prstGeom prst="rect">
-            <a:avLst/>
-          </a:prstGeom>
-          <a:noFill/>
-        </p:spPr>
-        <p:txBody>
-          <a:bodyPr wrap="square" lIns="0" tIns="0" rIns="0" bIns="0" rtlCol="0">
-            <a:noAutofit/>
-          </a:bodyPr>
-          <a:lstStyle/>
-          <a:p>
-            <a:pPr algn="ctr"/>
-            <a:r>
-              <a:rPr lang="en-US" sz="1100" dirty="0">
-                <a:solidFill>
-                  <a:srgbClr val="597B78"/>
-                </a:solidFill>
-              </a:rPr>
-              <a:t>1</a:t>
-            </a:r>
-            <a:endParaRPr lang="en-SG" sz="1100" dirty="0">
-              <a:solidFill>
-                <a:srgbClr val="597B78"/>
-              </a:solidFill>
-            </a:endParaRPr>
-          </a:p>
-        </p:txBody>
-      </p:sp>
-      <p:sp>
-        <p:nvSpPr>
-          <p:cNvPr id="35" name="Rectangle 8">
-            <a:extLst>
-              <a:ext uri="{FF2B5EF4-FFF2-40B4-BE49-F238E27FC236}">
-                <a16:creationId xmlns:a16="http://schemas.microsoft.com/office/drawing/2014/main" id="{A8BAEB94-8A75-492A-B233-71634E95CCE5}"/>
-              </a:ext>
-            </a:extLst>
-          </p:cNvPr>
-          <p:cNvSpPr/>
-          <p:nvPr/>
-        </p:nvSpPr>
-        <p:spPr>
-          <a:xfrm>
-            <a:off x="3791635" y="3569002"/>
-            <a:ext cx="982173" cy="331504"/>
-          </a:xfrm>
-          <a:prstGeom prst="rect">
-            <a:avLst/>
-          </a:prstGeom>
-          <a:gradFill flip="none" rotWithShape="1">
-            <a:gsLst>
-              <a:gs pos="0">
-                <a:srgbClr val="BED0CF">
-                  <a:tint val="66000"/>
-                  <a:satMod val="160000"/>
-                </a:srgbClr>
-              </a:gs>
-              <a:gs pos="50000">
-                <a:srgbClr val="BED0CF">
-                  <a:tint val="44500"/>
-                  <a:satMod val="160000"/>
-                </a:srgbClr>
-              </a:gs>
-              <a:gs pos="100000">
-                <a:srgbClr val="BED0CF">
-                  <a:tint val="23500"/>
-                  <a:satMod val="160000"/>
-                </a:srgbClr>
-              </a:gs>
-            </a:gsLst>
-            <a:lin ang="16200000" scaled="1"/>
-            <a:tileRect/>
-          </a:gradFill>
-          <a:ln w="19050">
-            <a:solidFill>
-              <a:srgbClr val="597B78"/>
-            </a:solidFill>
-          </a:ln>
-          <a:effectLst/>
-        </p:spPr>
-        <p:style>
-          <a:lnRef idx="1">
-            <a:schemeClr val="accent4"/>
-          </a:lnRef>
-          <a:fillRef idx="2">
-            <a:schemeClr val="accent4"/>
-          </a:fillRef>
-          <a:effectRef idx="1">
-            <a:schemeClr val="accent4"/>
-          </a:effectRef>
-          <a:fontRef idx="minor">
-            <a:schemeClr val="dk1"/>
-          </a:fontRef>
-        </p:style>
-        <p:txBody>
-          <a:bodyPr rtlCol="0" anchor="ctr"/>
-          <a:lstStyle/>
-          <a:p>
-            <a:pPr algn="ctr"/>
-            <a:r>
-              <a:rPr lang="en-US" sz="1050" dirty="0" err="1">
-                <a:solidFill>
-                  <a:srgbClr val="597B78"/>
-                </a:solidFill>
-              </a:rPr>
-              <a:t>QuizUiDisplayFormatter</a:t>
-            </a:r>
-            <a:endParaRPr lang="en-SG" sz="1050" dirty="0">
-              <a:solidFill>
-                <a:srgbClr val="597B78"/>
-              </a:solidFill>
-            </a:endParaRPr>
-          </a:p>
-        </p:txBody>
-      </p:sp>
-      <p:grpSp>
-        <p:nvGrpSpPr>
-          <p:cNvPr id="61" name="Group 60">
-            <a:extLst>
-              <a:ext uri="{FF2B5EF4-FFF2-40B4-BE49-F238E27FC236}">
-                <a16:creationId xmlns:a16="http://schemas.microsoft.com/office/drawing/2014/main" id="{0B449FCB-EF63-4AAD-ADA9-67511FA36845}"/>
-              </a:ext>
-            </a:extLst>
-          </p:cNvPr>
-          <p:cNvGrpSpPr/>
-          <p:nvPr/>
-        </p:nvGrpSpPr>
-        <p:grpSpPr>
-          <a:xfrm rot="16200000">
-            <a:off x="2944188" y="2250717"/>
-            <a:ext cx="454604" cy="216000"/>
-            <a:chOff x="2618285" y="1438790"/>
-            <a:chExt cx="454604" cy="216000"/>
-          </a:xfrm>
-        </p:grpSpPr>
-        <p:cxnSp>
-          <p:nvCxnSpPr>
-            <p:cNvPr id="40" name="Straight Arrow Connector 39">
-              <a:extLst>
-                <a:ext uri="{FF2B5EF4-FFF2-40B4-BE49-F238E27FC236}">
-                  <a16:creationId xmlns:a16="http://schemas.microsoft.com/office/drawing/2014/main" id="{6F187A06-2033-4C0C-91E2-C0C3FCB0A53F}"/>
-                </a:ext>
-              </a:extLst>
-            </p:cNvPr>
-            <p:cNvCxnSpPr>
-              <a:cxnSpLocks/>
-              <a:stCxn id="41" idx="3"/>
-              <a:endCxn id="43" idx="2"/>
-            </p:cNvCxnSpPr>
-            <p:nvPr/>
-          </p:nvCxnSpPr>
-          <p:spPr>
-            <a:xfrm rot="5400000" flipV="1">
-              <a:off x="2953587" y="1427488"/>
-              <a:ext cx="0" cy="238605"/>
-            </a:xfrm>
-            <a:prstGeom prst="straightConnector1">
-              <a:avLst/>
-            </a:prstGeom>
-            <a:ln w="19050">
-              <a:solidFill>
-                <a:srgbClr val="597B78"/>
-              </a:solidFill>
-              <a:headEnd type="none" w="med" len="med"/>
-              <a:tailEnd type="arrow" w="med" len="med"/>
-            </a:ln>
-            <a:effectLst/>
-          </p:spPr>
-          <p:style>
-            <a:lnRef idx="1">
-              <a:schemeClr val="accent2"/>
-            </a:lnRef>
-            <a:fillRef idx="2">
-              <a:schemeClr val="accent2"/>
-            </a:fillRef>
-            <a:effectRef idx="1">
-              <a:schemeClr val="accent2"/>
-            </a:effectRef>
-            <a:fontRef idx="minor">
-              <a:schemeClr val="dk1"/>
-            </a:fontRef>
-          </p:style>
-        </p:cxnSp>
-        <p:sp>
-          <p:nvSpPr>
-            <p:cNvPr id="41" name="Flowchart: Decision 96">
-              <a:extLst>
-                <a:ext uri="{FF2B5EF4-FFF2-40B4-BE49-F238E27FC236}">
-                  <a16:creationId xmlns:a16="http://schemas.microsoft.com/office/drawing/2014/main" id="{6C7B7E57-6CE4-43DC-935C-D25670D236B2}"/>
-                </a:ext>
-              </a:extLst>
-            </p:cNvPr>
-            <p:cNvSpPr/>
-            <p:nvPr/>
-          </p:nvSpPr>
-          <p:spPr>
-            <a:xfrm>
-              <a:off x="2618285" y="1438790"/>
-              <a:ext cx="216000" cy="216000"/>
-            </a:xfrm>
-            <a:prstGeom prst="flowChartDecision">
-              <a:avLst/>
-            </a:prstGeom>
-            <a:noFill/>
-            <a:ln w="19050">
-              <a:solidFill>
-                <a:srgbClr val="597B78"/>
+                <a:schemeClr val="bg1">
+                  <a:lumMod val="50000"/>
+                </a:schemeClr>
               </a:solidFill>
             </a:ln>
             <a:effectLst/>
@@ -5539,66 +4809,67 @@
             <a:lstStyle/>
             <a:p>
               <a:pPr algn="ctr"/>
-              <a:endParaRPr lang="en-US" sz="1050">
-                <a:solidFill>
-                  <a:srgbClr val="597B78"/>
-                </a:solidFill>
-              </a:endParaRPr>
+              <a:endParaRPr lang="en-SG" sz="1050"/>
             </a:p>
           </p:txBody>
         </p:sp>
+        <p:cxnSp>
+          <p:nvCxnSpPr>
+            <p:cNvPr id="48" name="Straight Connector 47">
+              <a:extLst>
+                <a:ext uri="{FF2B5EF4-FFF2-40B4-BE49-F238E27FC236}">
+                  <a16:creationId xmlns:a16="http://schemas.microsoft.com/office/drawing/2014/main" id="{8B4C1B35-6E7A-4AB1-93C5-9B1E6DB5741C}"/>
+                </a:ext>
+              </a:extLst>
+            </p:cNvPr>
+            <p:cNvCxnSpPr>
+              <a:cxnSpLocks/>
+              <a:stCxn id="47" idx="3"/>
+            </p:cNvCxnSpPr>
+            <p:nvPr/>
+          </p:nvCxnSpPr>
+          <p:spPr>
+            <a:xfrm flipV="1">
+              <a:off x="2986603" y="3022463"/>
+              <a:ext cx="216105" cy="1"/>
+            </a:xfrm>
+            <a:prstGeom prst="line">
+              <a:avLst/>
+            </a:prstGeom>
+            <a:ln w="19050">
+              <a:solidFill>
+                <a:schemeClr val="bg1">
+                  <a:lumMod val="50000"/>
+                </a:schemeClr>
+              </a:solidFill>
+              <a:prstDash val="sysDot"/>
+              <a:headEnd type="none" w="med" len="med"/>
+              <a:tailEnd type="none" w="med" len="med"/>
+            </a:ln>
+            <a:effectLst/>
+          </p:spPr>
+          <p:style>
+            <a:lnRef idx="1">
+              <a:schemeClr val="accent2"/>
+            </a:lnRef>
+            <a:fillRef idx="2">
+              <a:schemeClr val="accent2"/>
+            </a:fillRef>
+            <a:effectRef idx="1">
+              <a:schemeClr val="accent2"/>
+            </a:effectRef>
+            <a:fontRef idx="minor">
+              <a:schemeClr val="dk1"/>
+            </a:fontRef>
+          </p:style>
+        </p:cxnSp>
       </p:grpSp>
       <p:sp>
         <p:nvSpPr>
-          <p:cNvPr id="42" name="TextBox 41">
+          <p:cNvPr id="52" name="Rectangle 62">
             <a:extLst>
               <a:ext uri="{FF2B5EF4-FFF2-40B4-BE49-F238E27FC236}">
-                <a16:creationId xmlns:a16="http://schemas.microsoft.com/office/drawing/2014/main" id="{7E46D3EB-7AB1-45F8-AD96-F34BEF7CB0B4}"/>
-              </a:ext>
-            </a:extLst>
-          </p:cNvPr>
-          <p:cNvSpPr txBox="1"/>
-          <p:nvPr/>
-        </p:nvSpPr>
-        <p:spPr>
-          <a:xfrm>
-            <a:off x="3191101" y="2126861"/>
-            <a:ext cx="189257" cy="178683"/>
-          </a:xfrm>
-          <a:prstGeom prst="rect">
-            <a:avLst/>
-          </a:prstGeom>
-          <a:noFill/>
-        </p:spPr>
-        <p:txBody>
-          <a:bodyPr wrap="square" lIns="0" tIns="0" rIns="0" bIns="0" rtlCol="0">
-            <a:noAutofit/>
-          </a:bodyPr>
-          <a:lstStyle/>
-          <a:p>
-            <a:pPr algn="ctr"/>
-            <a:r>
-              <a:rPr lang="en-US" sz="1100" dirty="0">
-                <a:solidFill>
-                  <a:srgbClr val="597B78"/>
-                </a:solidFill>
-              </a:rPr>
-              <a:t>1</a:t>
-            </a:r>
-            <a:endParaRPr lang="en-SG" sz="1100" dirty="0">
-              <a:solidFill>
-                <a:srgbClr val="597B78"/>
-              </a:solidFill>
-            </a:endParaRPr>
-          </a:p>
-        </p:txBody>
-      </p:sp>
-      <p:sp>
-        <p:nvSpPr>
-          <p:cNvPr id="43" name="Rectangle 8">
-            <a:extLst>
-              <a:ext uri="{FF2B5EF4-FFF2-40B4-BE49-F238E27FC236}">
-                <a16:creationId xmlns:a16="http://schemas.microsoft.com/office/drawing/2014/main" id="{4D3C1E3D-A3A0-46E3-8E74-38A7F160AD2C}"/>
+                <a16:creationId xmlns:a16="http://schemas.microsoft.com/office/drawing/2014/main" id="{370A01B8-EA5F-4354-AABE-138FD3B9D16A}"/>
               </a:ext>
             </a:extLst>
           </p:cNvPr>
@@ -5607,8 +4878,174 @@
         </p:nvSpPr>
         <p:spPr>
           <a:xfrm>
-            <a:off x="2660552" y="1790826"/>
-            <a:ext cx="1021875" cy="340588"/>
+            <a:off x="745890" y="1769471"/>
+            <a:ext cx="1386935" cy="346760"/>
+          </a:xfrm>
+          <a:prstGeom prst="rect">
+            <a:avLst/>
+          </a:prstGeom>
+          <a:solidFill>
+            <a:srgbClr val="0E5B5B"/>
+          </a:solidFill>
+          <a:ln w="19050">
+            <a:solidFill>
+              <a:srgbClr val="0E5B5B"/>
+            </a:solidFill>
+          </a:ln>
+          <a:effectLst/>
+        </p:spPr>
+        <p:style>
+          <a:lnRef idx="1">
+            <a:schemeClr val="accent2"/>
+          </a:lnRef>
+          <a:fillRef idx="2">
+            <a:schemeClr val="accent2"/>
+          </a:fillRef>
+          <a:effectRef idx="1">
+            <a:schemeClr val="accent2"/>
+          </a:effectRef>
+          <a:fontRef idx="minor">
+            <a:schemeClr val="dk1"/>
+          </a:fontRef>
+        </p:style>
+        <p:txBody>
+          <a:bodyPr rtlCol="0" anchor="ctr"/>
+          <a:lstStyle/>
+          <a:p>
+            <a:pPr algn="ctr"/>
+            <a:r>
+              <a:rPr lang="en-US" sz="1050" dirty="0">
+                <a:solidFill>
+                  <a:schemeClr val="bg1"/>
+                </a:solidFill>
+              </a:rPr>
+              <a:t>&lt;&lt;interface&gt;&gt;</a:t>
+            </a:r>
+          </a:p>
+          <a:p>
+            <a:pPr algn="ctr"/>
+            <a:r>
+              <a:rPr lang="en-US" sz="1050" dirty="0" err="1">
+                <a:solidFill>
+                  <a:schemeClr val="bg1"/>
+                </a:solidFill>
+              </a:rPr>
+              <a:t>QuizModel</a:t>
+            </a:r>
+            <a:endParaRPr lang="en-SG" sz="1050" dirty="0">
+              <a:solidFill>
+                <a:schemeClr val="bg1"/>
+              </a:solidFill>
+            </a:endParaRPr>
+          </a:p>
+        </p:txBody>
+      </p:sp>
+      <p:cxnSp>
+        <p:nvCxnSpPr>
+          <p:cNvPr id="49" name="Straight Connector 48">
+            <a:extLst>
+              <a:ext uri="{FF2B5EF4-FFF2-40B4-BE49-F238E27FC236}">
+                <a16:creationId xmlns:a16="http://schemas.microsoft.com/office/drawing/2014/main" id="{4F433864-0133-43C5-8443-E67012D3F290}"/>
+              </a:ext>
+            </a:extLst>
+          </p:cNvPr>
+          <p:cNvCxnSpPr>
+            <a:cxnSpLocks/>
+          </p:cNvCxnSpPr>
+          <p:nvPr/>
+        </p:nvCxnSpPr>
+        <p:spPr>
+          <a:xfrm flipV="1">
+            <a:off x="2530861" y="1372345"/>
+            <a:ext cx="0" cy="1293360"/>
+          </a:xfrm>
+          <a:prstGeom prst="line">
+            <a:avLst/>
+          </a:prstGeom>
+          <a:ln w="19050">
+            <a:solidFill>
+              <a:srgbClr val="0E5B5B"/>
+            </a:solidFill>
+          </a:ln>
+        </p:spPr>
+        <p:style>
+          <a:lnRef idx="1">
+            <a:schemeClr val="accent1"/>
+          </a:lnRef>
+          <a:fillRef idx="0">
+            <a:schemeClr val="accent1"/>
+          </a:fillRef>
+          <a:effectRef idx="0">
+            <a:schemeClr val="accent1"/>
+          </a:effectRef>
+          <a:fontRef idx="minor">
+            <a:schemeClr val="tx1"/>
+          </a:fontRef>
+        </p:style>
+      </p:cxnSp>
+      <p:cxnSp>
+        <p:nvCxnSpPr>
+          <p:cNvPr id="68" name="Straight Arrow Connector 67">
+            <a:extLst>
+              <a:ext uri="{FF2B5EF4-FFF2-40B4-BE49-F238E27FC236}">
+                <a16:creationId xmlns:a16="http://schemas.microsoft.com/office/drawing/2014/main" id="{C24F76CA-505F-4647-AD34-1F9EB2BBA22B}"/>
+              </a:ext>
+            </a:extLst>
+          </p:cNvPr>
+          <p:cNvCxnSpPr>
+            <a:cxnSpLocks/>
+            <a:endCxn id="69" idx="1"/>
+          </p:cNvCxnSpPr>
+          <p:nvPr/>
+        </p:nvCxnSpPr>
+        <p:spPr>
+          <a:xfrm flipV="1">
+            <a:off x="2525183" y="1372345"/>
+            <a:ext cx="238976" cy="3256"/>
+          </a:xfrm>
+          <a:prstGeom prst="straightConnector1">
+            <a:avLst/>
+          </a:prstGeom>
+          <a:ln w="19050">
+            <a:solidFill>
+              <a:srgbClr val="0E5B5B"/>
+            </a:solidFill>
+            <a:headEnd type="none" w="med" len="med"/>
+            <a:tailEnd type="arrow" w="med" len="med"/>
+          </a:ln>
+          <a:effectLst/>
+        </p:spPr>
+        <p:style>
+          <a:lnRef idx="1">
+            <a:schemeClr val="accent2"/>
+          </a:lnRef>
+          <a:fillRef idx="2">
+            <a:schemeClr val="accent2"/>
+          </a:fillRef>
+          <a:effectRef idx="1">
+            <a:schemeClr val="accent2"/>
+          </a:effectRef>
+          <a:fontRef idx="minor">
+            <a:schemeClr val="dk1"/>
+          </a:fontRef>
+        </p:style>
+      </p:cxnSp>
+      <p:sp>
+        <p:nvSpPr>
+          <p:cNvPr id="69" name="Rectangle 62">
+            <a:extLst>
+              <a:ext uri="{FF2B5EF4-FFF2-40B4-BE49-F238E27FC236}">
+                <a16:creationId xmlns:a16="http://schemas.microsoft.com/office/drawing/2014/main" id="{311EFD4B-B25C-4F2A-A63E-C8026141FF0A}"/>
+              </a:ext>
+            </a:extLst>
+          </p:cNvPr>
+          <p:cNvSpPr/>
+          <p:nvPr/>
+        </p:nvSpPr>
+        <p:spPr>
+          <a:xfrm>
+            <a:off x="2764159" y="1198965"/>
+            <a:ext cx="2017791" cy="346760"/>
           </a:xfrm>
           <a:prstGeom prst="rect">
             <a:avLst/>
@@ -5617,19 +5054,21 @@
             <a:srgbClr val="7030A0"/>
           </a:solidFill>
           <a:ln w="19050">
-            <a:noFill/>
+            <a:solidFill>
+              <a:srgbClr val="7030A0"/>
+            </a:solidFill>
           </a:ln>
           <a:effectLst/>
         </p:spPr>
         <p:style>
           <a:lnRef idx="1">
-            <a:schemeClr val="accent4"/>
+            <a:schemeClr val="accent2"/>
           </a:lnRef>
           <a:fillRef idx="2">
-            <a:schemeClr val="accent4"/>
+            <a:schemeClr val="accent2"/>
           </a:fillRef>
           <a:effectRef idx="1">
-            <a:schemeClr val="accent4"/>
+            <a:schemeClr val="accent2"/>
           </a:effectRef>
           <a:fontRef idx="minor">
             <a:schemeClr val="dk1"/>
@@ -5651,6 +5090,99 @@
             <a:endParaRPr lang="en-SG" sz="1050" dirty="0">
               <a:solidFill>
                 <a:schemeClr val="bg1"/>
+              </a:solidFill>
+            </a:endParaRPr>
+          </a:p>
+        </p:txBody>
+      </p:sp>
+      <p:sp>
+        <p:nvSpPr>
+          <p:cNvPr id="71" name="TextBox 70">
+            <a:extLst>
+              <a:ext uri="{FF2B5EF4-FFF2-40B4-BE49-F238E27FC236}">
+                <a16:creationId xmlns:a16="http://schemas.microsoft.com/office/drawing/2014/main" id="{838619D4-D2E2-4CE2-8C5D-4DB0430E53D5}"/>
+              </a:ext>
+            </a:extLst>
+          </p:cNvPr>
+          <p:cNvSpPr txBox="1"/>
+          <p:nvPr/>
+        </p:nvSpPr>
+        <p:spPr>
+          <a:xfrm>
+            <a:off x="2601001" y="1423985"/>
+            <a:ext cx="189257" cy="178683"/>
+          </a:xfrm>
+          <a:prstGeom prst="rect">
+            <a:avLst/>
+          </a:prstGeom>
+          <a:noFill/>
+        </p:spPr>
+        <p:txBody>
+          <a:bodyPr wrap="square" lIns="0" tIns="0" rIns="0" bIns="0" rtlCol="0">
+            <a:noAutofit/>
+          </a:bodyPr>
+          <a:lstStyle/>
+          <a:p>
+            <a:pPr algn="ctr"/>
+            <a:r>
+              <a:rPr lang="en-US" sz="1100" dirty="0">
+                <a:solidFill>
+                  <a:srgbClr val="0E5B5B"/>
+                </a:solidFill>
+              </a:rPr>
+              <a:t>1</a:t>
+            </a:r>
+            <a:endParaRPr lang="en-SG" sz="1100" dirty="0">
+              <a:solidFill>
+                <a:srgbClr val="0E5B5B"/>
+              </a:solidFill>
+            </a:endParaRPr>
+          </a:p>
+        </p:txBody>
+      </p:sp>
+      <p:sp>
+        <p:nvSpPr>
+          <p:cNvPr id="78" name="TextBox 77">
+            <a:extLst>
+              <a:ext uri="{FF2B5EF4-FFF2-40B4-BE49-F238E27FC236}">
+                <a16:creationId xmlns:a16="http://schemas.microsoft.com/office/drawing/2014/main" id="{D0640240-60C6-4D70-B73A-BBBF69228CB3}"/>
+              </a:ext>
+            </a:extLst>
+          </p:cNvPr>
+          <p:cNvSpPr txBox="1"/>
+          <p:nvPr/>
+        </p:nvSpPr>
+        <p:spPr>
+          <a:xfrm>
+            <a:off x="2569511" y="2720272"/>
+            <a:ext cx="189257" cy="178683"/>
+          </a:xfrm>
+          <a:prstGeom prst="rect">
+            <a:avLst/>
+          </a:prstGeom>
+          <a:noFill/>
+          <a:ln>
+            <a:noFill/>
+          </a:ln>
+        </p:spPr>
+        <p:txBody>
+          <a:bodyPr wrap="square" lIns="0" tIns="0" rIns="0" bIns="0" rtlCol="0">
+            <a:noAutofit/>
+          </a:bodyPr>
+          <a:lstStyle/>
+          <a:p>
+            <a:pPr algn="ctr"/>
+            <a:r>
+              <a:rPr lang="en-US" sz="1100" dirty="0">
+                <a:solidFill>
+                  <a:srgbClr val="0E5B5B"/>
+                </a:solidFill>
+              </a:rPr>
+              <a:t>1</a:t>
+            </a:r>
+            <a:endParaRPr lang="en-SG" sz="1100" dirty="0">
+              <a:solidFill>
+                <a:srgbClr val="0E5B5B"/>
               </a:solidFill>
             </a:endParaRPr>
           </a:p>

</xml_diff>